<commit_message>
Update code and assets
</commit_message>
<xml_diff>
--- a/Skripsi.pptx
+++ b/Skripsi.pptx
@@ -18,18 +18,19 @@
     <p:sldId id="266" r:id="rId12"/>
     <p:sldId id="267" r:id="rId13"/>
     <p:sldId id="268" r:id="rId14"/>
-    <p:sldId id="269" r:id="rId15"/>
-    <p:sldId id="277" r:id="rId16"/>
-    <p:sldId id="270" r:id="rId17"/>
-    <p:sldId id="271" r:id="rId18"/>
-    <p:sldId id="272" r:id="rId19"/>
-    <p:sldId id="273" r:id="rId20"/>
-    <p:sldId id="274" r:id="rId21"/>
-    <p:sldId id="275" r:id="rId22"/>
-    <p:sldId id="279" r:id="rId23"/>
-    <p:sldId id="276" r:id="rId24"/>
-    <p:sldId id="278" r:id="rId25"/>
-    <p:sldId id="280" r:id="rId26"/>
+    <p:sldId id="281" r:id="rId15"/>
+    <p:sldId id="269" r:id="rId16"/>
+    <p:sldId id="277" r:id="rId17"/>
+    <p:sldId id="270" r:id="rId18"/>
+    <p:sldId id="271" r:id="rId19"/>
+    <p:sldId id="272" r:id="rId20"/>
+    <p:sldId id="273" r:id="rId21"/>
+    <p:sldId id="274" r:id="rId22"/>
+    <p:sldId id="275" r:id="rId23"/>
+    <p:sldId id="279" r:id="rId24"/>
+    <p:sldId id="276" r:id="rId25"/>
+    <p:sldId id="278" r:id="rId26"/>
+    <p:sldId id="280" r:id="rId27"/>
   </p:sldIdLst>
   <p:sldSz cx="12192000" cy="6858000"/>
   <p:notesSz cx="6858000" cy="9144000"/>
@@ -170,6 +171,7 @@
         <p14:section name="Tutorial" id="{D54BF797-C767-444A-9572-973AB85F15AA}">
           <p14:sldIdLst>
             <p14:sldId id="268"/>
+            <p14:sldId id="281"/>
             <p14:sldId id="269"/>
           </p14:sldIdLst>
         </p14:section>
@@ -346,7 +348,7 @@
           <a:p>
             <a:fld id="{C243E368-DEE7-4F4C-A29B-11F0F5607B18}" type="datetimeFigureOut">
               <a:rPr lang="id-ID" smtClean="0"/>
-              <a:t>10/11/2024</a:t>
+              <a:t>19/11/2024</a:t>
             </a:fld>
             <a:endParaRPr lang="id-ID"/>
           </a:p>
@@ -546,7 +548,7 @@
           <a:p>
             <a:fld id="{C243E368-DEE7-4F4C-A29B-11F0F5607B18}" type="datetimeFigureOut">
               <a:rPr lang="id-ID" smtClean="0"/>
-              <a:t>10/11/2024</a:t>
+              <a:t>19/11/2024</a:t>
             </a:fld>
             <a:endParaRPr lang="id-ID"/>
           </a:p>
@@ -756,7 +758,7 @@
           <a:p>
             <a:fld id="{C243E368-DEE7-4F4C-A29B-11F0F5607B18}" type="datetimeFigureOut">
               <a:rPr lang="id-ID" smtClean="0"/>
-              <a:t>10/11/2024</a:t>
+              <a:t>19/11/2024</a:t>
             </a:fld>
             <a:endParaRPr lang="id-ID"/>
           </a:p>
@@ -956,7 +958,7 @@
           <a:p>
             <a:fld id="{C243E368-DEE7-4F4C-A29B-11F0F5607B18}" type="datetimeFigureOut">
               <a:rPr lang="id-ID" smtClean="0"/>
-              <a:t>10/11/2024</a:t>
+              <a:t>19/11/2024</a:t>
             </a:fld>
             <a:endParaRPr lang="id-ID"/>
           </a:p>
@@ -1232,7 +1234,7 @@
           <a:p>
             <a:fld id="{C243E368-DEE7-4F4C-A29B-11F0F5607B18}" type="datetimeFigureOut">
               <a:rPr lang="id-ID" smtClean="0"/>
-              <a:t>10/11/2024</a:t>
+              <a:t>19/11/2024</a:t>
             </a:fld>
             <a:endParaRPr lang="id-ID"/>
           </a:p>
@@ -1500,7 +1502,7 @@
           <a:p>
             <a:fld id="{C243E368-DEE7-4F4C-A29B-11F0F5607B18}" type="datetimeFigureOut">
               <a:rPr lang="id-ID" smtClean="0"/>
-              <a:t>10/11/2024</a:t>
+              <a:t>19/11/2024</a:t>
             </a:fld>
             <a:endParaRPr lang="id-ID"/>
           </a:p>
@@ -1915,7 +1917,7 @@
           <a:p>
             <a:fld id="{C243E368-DEE7-4F4C-A29B-11F0F5607B18}" type="datetimeFigureOut">
               <a:rPr lang="id-ID" smtClean="0"/>
-              <a:t>10/11/2024</a:t>
+              <a:t>19/11/2024</a:t>
             </a:fld>
             <a:endParaRPr lang="id-ID"/>
           </a:p>
@@ -2057,7 +2059,7 @@
           <a:p>
             <a:fld id="{C243E368-DEE7-4F4C-A29B-11F0F5607B18}" type="datetimeFigureOut">
               <a:rPr lang="id-ID" smtClean="0"/>
-              <a:t>10/11/2024</a:t>
+              <a:t>19/11/2024</a:t>
             </a:fld>
             <a:endParaRPr lang="id-ID"/>
           </a:p>
@@ -2170,7 +2172,7 @@
           <a:p>
             <a:fld id="{C243E368-DEE7-4F4C-A29B-11F0F5607B18}" type="datetimeFigureOut">
               <a:rPr lang="id-ID" smtClean="0"/>
-              <a:t>10/11/2024</a:t>
+              <a:t>19/11/2024</a:t>
             </a:fld>
             <a:endParaRPr lang="id-ID"/>
           </a:p>
@@ -2483,7 +2485,7 @@
           <a:p>
             <a:fld id="{C243E368-DEE7-4F4C-A29B-11F0F5607B18}" type="datetimeFigureOut">
               <a:rPr lang="id-ID" smtClean="0"/>
-              <a:t>10/11/2024</a:t>
+              <a:t>19/11/2024</a:t>
             </a:fld>
             <a:endParaRPr lang="id-ID"/>
           </a:p>
@@ -2772,7 +2774,7 @@
           <a:p>
             <a:fld id="{C243E368-DEE7-4F4C-A29B-11F0F5607B18}" type="datetimeFigureOut">
               <a:rPr lang="id-ID" smtClean="0"/>
-              <a:t>10/11/2024</a:t>
+              <a:t>19/11/2024</a:t>
             </a:fld>
             <a:endParaRPr lang="id-ID"/>
           </a:p>
@@ -3015,7 +3017,7 @@
           <a:p>
             <a:fld id="{C243E368-DEE7-4F4C-A29B-11F0F5607B18}" type="datetimeFigureOut">
               <a:rPr lang="id-ID" smtClean="0"/>
-              <a:t>10/11/2024</a:t>
+              <a:t>19/11/2024</a:t>
             </a:fld>
             <a:endParaRPr lang="id-ID"/>
           </a:p>
@@ -5512,10 +5514,10 @@
       </p:grpSpPr>
       <p:grpSp>
         <p:nvGrpSpPr>
-          <p:cNvPr id="20" name="Group 19">
+          <p:cNvPr id="14" name="Group 13">
             <a:extLst>
               <a:ext uri="{FF2B5EF4-FFF2-40B4-BE49-F238E27FC236}">
-                <a16:creationId xmlns:a16="http://schemas.microsoft.com/office/drawing/2014/main" id="{41A4CB90-4EEF-040A-41E4-00D4C5BE1D99}"/>
+                <a16:creationId xmlns:a16="http://schemas.microsoft.com/office/drawing/2014/main" id="{04BA794C-6DA5-7E39-D2D9-09EE6C47F099}"/>
               </a:ext>
             </a:extLst>
           </p:cNvPr>
@@ -5532,10 +5534,10 @@
         </p:grpSpPr>
         <p:grpSp>
           <p:nvGrpSpPr>
-            <p:cNvPr id="71" name="Group 70">
+            <p:cNvPr id="20" name="Group 19">
               <a:extLst>
                 <a:ext uri="{FF2B5EF4-FFF2-40B4-BE49-F238E27FC236}">
-                  <a16:creationId xmlns:a16="http://schemas.microsoft.com/office/drawing/2014/main" id="{AEC9CD78-1168-325B-EC54-9D234FD29947}"/>
+                  <a16:creationId xmlns:a16="http://schemas.microsoft.com/office/drawing/2014/main" id="{41A4CB90-4EEF-040A-41E4-00D4C5BE1D99}"/>
                 </a:ext>
               </a:extLst>
             </p:cNvPr>
@@ -5552,10 +5554,10 @@
           </p:grpSpPr>
           <p:grpSp>
             <p:nvGrpSpPr>
-              <p:cNvPr id="3" name="Group 2">
+              <p:cNvPr id="71" name="Group 70">
                 <a:extLst>
                   <a:ext uri="{FF2B5EF4-FFF2-40B4-BE49-F238E27FC236}">
-                    <a16:creationId xmlns:a16="http://schemas.microsoft.com/office/drawing/2014/main" id="{7E4FC055-5549-13AF-48C4-FA9FA389B02D}"/>
+                    <a16:creationId xmlns:a16="http://schemas.microsoft.com/office/drawing/2014/main" id="{AEC9CD78-1168-325B-EC54-9D234FD29947}"/>
                   </a:ext>
                 </a:extLst>
               </p:cNvPr>
@@ -5566,16 +5568,16 @@
               <a:xfrm>
                 <a:off x="698938" y="323193"/>
                 <a:ext cx="10794124" cy="6211614"/>
-                <a:chOff x="1040524" y="323193"/>
+                <a:chOff x="698938" y="323193"/>
                 <a:chExt cx="10794124" cy="6211614"/>
               </a:xfrm>
             </p:grpSpPr>
             <p:grpSp>
               <p:nvGrpSpPr>
-                <p:cNvPr id="39" name="Group 38">
+                <p:cNvPr id="3" name="Group 2">
                   <a:extLst>
                     <a:ext uri="{FF2B5EF4-FFF2-40B4-BE49-F238E27FC236}">
-                      <a16:creationId xmlns:a16="http://schemas.microsoft.com/office/drawing/2014/main" id="{570BBF59-6040-3C35-3794-23BA2F3A7E13}"/>
+                      <a16:creationId xmlns:a16="http://schemas.microsoft.com/office/drawing/2014/main" id="{7E4FC055-5549-13AF-48C4-FA9FA389B02D}"/>
                     </a:ext>
                   </a:extLst>
                 </p:cNvPr>
@@ -5584,18 +5586,154 @@
               </p:nvGrpSpPr>
               <p:grpSpPr>
                 <a:xfrm>
-                  <a:off x="1040524" y="323193"/>
+                  <a:off x="698938" y="323193"/>
                   <a:ext cx="10794124" cy="6211614"/>
-                  <a:chOff x="357350" y="323193"/>
-                  <a:chExt cx="11477298" cy="6211614"/>
+                  <a:chOff x="1040524" y="323193"/>
+                  <a:chExt cx="10794124" cy="6211614"/>
                 </a:xfrm>
               </p:grpSpPr>
+              <p:grpSp>
+                <p:nvGrpSpPr>
+                  <p:cNvPr id="39" name="Group 38">
+                    <a:extLst>
+                      <a:ext uri="{FF2B5EF4-FFF2-40B4-BE49-F238E27FC236}">
+                        <a16:creationId xmlns:a16="http://schemas.microsoft.com/office/drawing/2014/main" id="{570BBF59-6040-3C35-3794-23BA2F3A7E13}"/>
+                      </a:ext>
+                    </a:extLst>
+                  </p:cNvPr>
+                  <p:cNvGrpSpPr/>
+                  <p:nvPr/>
+                </p:nvGrpSpPr>
+                <p:grpSpPr>
+                  <a:xfrm>
+                    <a:off x="1040524" y="323193"/>
+                    <a:ext cx="10794124" cy="6211614"/>
+                    <a:chOff x="357350" y="323193"/>
+                    <a:chExt cx="11477298" cy="6211614"/>
+                  </a:xfrm>
+                </p:grpSpPr>
+                <p:sp>
+                  <p:nvSpPr>
+                    <p:cNvPr id="4" name="Rectangle: Rounded Corners 3">
+                      <a:extLst>
+                        <a:ext uri="{FF2B5EF4-FFF2-40B4-BE49-F238E27FC236}">
+                          <a16:creationId xmlns:a16="http://schemas.microsoft.com/office/drawing/2014/main" id="{EFDB4FF0-7B8D-35AE-012A-8CC1241D02B8}"/>
+                        </a:ext>
+                      </a:extLst>
+                    </p:cNvPr>
+                    <p:cNvSpPr/>
+                    <p:nvPr/>
+                  </p:nvSpPr>
+                  <p:spPr>
+                    <a:xfrm>
+                      <a:off x="357350" y="323193"/>
+                      <a:ext cx="11477297" cy="6211614"/>
+                    </a:xfrm>
+                    <a:prstGeom prst="roundRect">
+                      <a:avLst/>
+                    </a:prstGeom>
+                    <a:solidFill>
+                      <a:srgbClr val="0C385A"/>
+                    </a:solidFill>
+                    <a:ln>
+                      <a:noFill/>
+                    </a:ln>
+                  </p:spPr>
+                  <p:style>
+                    <a:lnRef idx="2">
+                      <a:schemeClr val="accent1">
+                        <a:shade val="15000"/>
+                      </a:schemeClr>
+                    </a:lnRef>
+                    <a:fillRef idx="1">
+                      <a:schemeClr val="accent1"/>
+                    </a:fillRef>
+                    <a:effectRef idx="0">
+                      <a:schemeClr val="accent1"/>
+                    </a:effectRef>
+                    <a:fontRef idx="minor">
+                      <a:schemeClr val="lt1"/>
+                    </a:fontRef>
+                  </p:style>
+                  <p:txBody>
+                    <a:bodyPr rtlCol="0" anchor="ctr"/>
+                    <a:lstStyle/>
+                    <a:p>
+                      <a:pPr algn="ctr"/>
+                      <a:endParaRPr lang="id-ID" dirty="0">
+                        <a:solidFill>
+                          <a:srgbClr val="0F4869"/>
+                        </a:solidFill>
+                      </a:endParaRPr>
+                    </a:p>
+                  </p:txBody>
+                </p:sp>
+                <p:sp>
+                  <p:nvSpPr>
+                    <p:cNvPr id="5" name="Rectangle: Rounded Corners 4">
+                      <a:extLst>
+                        <a:ext uri="{FF2B5EF4-FFF2-40B4-BE49-F238E27FC236}">
+                          <a16:creationId xmlns:a16="http://schemas.microsoft.com/office/drawing/2014/main" id="{BBF39829-694E-A8A0-F558-FED06FF6B1D9}"/>
+                        </a:ext>
+                      </a:extLst>
+                    </p:cNvPr>
+                    <p:cNvSpPr/>
+                    <p:nvPr/>
+                  </p:nvSpPr>
+                  <p:spPr>
+                    <a:xfrm>
+                      <a:off x="357351" y="323193"/>
+                      <a:ext cx="11477297" cy="6211614"/>
+                    </a:xfrm>
+                    <a:prstGeom prst="roundRect">
+                      <a:avLst/>
+                    </a:prstGeom>
+                    <a:noFill/>
+                    <a:ln w="254000">
+                      <a:solidFill>
+                        <a:srgbClr val="F6F04D"/>
+                      </a:solidFill>
+                    </a:ln>
+                    <a:scene3d>
+                      <a:camera prst="orthographicFront"/>
+                      <a:lightRig rig="threePt" dir="t"/>
+                    </a:scene3d>
+                    <a:sp3d>
+                      <a:bevelT prst="angle"/>
+                    </a:sp3d>
+                  </p:spPr>
+                  <p:style>
+                    <a:lnRef idx="2">
+                      <a:schemeClr val="accent1">
+                        <a:shade val="15000"/>
+                      </a:schemeClr>
+                    </a:lnRef>
+                    <a:fillRef idx="1">
+                      <a:schemeClr val="accent1"/>
+                    </a:fillRef>
+                    <a:effectRef idx="0">
+                      <a:schemeClr val="accent1"/>
+                    </a:effectRef>
+                    <a:fontRef idx="minor">
+                      <a:schemeClr val="lt1"/>
+                    </a:fontRef>
+                  </p:style>
+                  <p:txBody>
+                    <a:bodyPr rtlCol="0" anchor="ctr"/>
+                    <a:lstStyle/>
+                    <a:p>
+                      <a:pPr algn="ctr"/>
+                      <a:endParaRPr lang="id-ID" dirty="0"/>
+                    </a:p>
+                  </p:txBody>
+                </p:sp>
+              </p:grpSp>
               <p:sp>
                 <p:nvSpPr>
-                  <p:cNvPr id="4" name="Rectangle: Rounded Corners 3">
+                  <p:cNvPr id="2" name="Multiplication Sign 1">
                     <a:extLst>
                       <a:ext uri="{FF2B5EF4-FFF2-40B4-BE49-F238E27FC236}">
-                        <a16:creationId xmlns:a16="http://schemas.microsoft.com/office/drawing/2014/main" id="{EFDB4FF0-7B8D-35AE-012A-8CC1241D02B8}"/>
+                        <a16:creationId xmlns:a16="http://schemas.microsoft.com/office/drawing/2014/main" id="{CB07E7CA-6A5E-7812-863A-F7AB742EB355}"/>
                       </a:ext>
                     </a:extLst>
                   </p:cNvPr>
@@ -5604,18 +5742,25 @@
                 </p:nvSpPr>
                 <p:spPr>
                   <a:xfrm>
-                    <a:off x="357350" y="323193"/>
-                    <a:ext cx="11477297" cy="6211614"/>
+                    <a:off x="10831757" y="737419"/>
+                    <a:ext cx="568746" cy="568746"/>
                   </a:xfrm>
-                  <a:prstGeom prst="roundRect">
+                  <a:prstGeom prst="mathMultiply">
                     <a:avLst/>
                   </a:prstGeom>
                   <a:solidFill>
-                    <a:srgbClr val="0C385A"/>
+                    <a:srgbClr val="F5DC76"/>
                   </a:solidFill>
                   <a:ln>
                     <a:noFill/>
                   </a:ln>
+                  <a:effectLst>
+                    <a:glow rad="76200">
+                      <a:srgbClr val="F6F04D">
+                        <a:alpha val="20000"/>
+                      </a:srgbClr>
+                    </a:glow>
+                  </a:effectLst>
                 </p:spPr>
                 <p:style>
                   <a:lnRef idx="2">
@@ -5639,173 +5784,67 @@
                   <a:p>
                     <a:pPr algn="ctr"/>
                     <a:endParaRPr lang="id-ID" dirty="0">
-                      <a:solidFill>
-                        <a:srgbClr val="0F4869"/>
-                      </a:solidFill>
+                      <a:effectLst>
+                        <a:glow rad="139700">
+                          <a:schemeClr val="accent4">
+                            <a:satMod val="175000"/>
+                            <a:alpha val="20000"/>
+                          </a:schemeClr>
+                        </a:glow>
+                      </a:effectLst>
                     </a:endParaRPr>
-                  </a:p>
-                </p:txBody>
-              </p:sp>
-              <p:sp>
-                <p:nvSpPr>
-                  <p:cNvPr id="5" name="Rectangle: Rounded Corners 4">
-                    <a:extLst>
-                      <a:ext uri="{FF2B5EF4-FFF2-40B4-BE49-F238E27FC236}">
-                        <a16:creationId xmlns:a16="http://schemas.microsoft.com/office/drawing/2014/main" id="{BBF39829-694E-A8A0-F558-FED06FF6B1D9}"/>
-                      </a:ext>
-                    </a:extLst>
-                  </p:cNvPr>
-                  <p:cNvSpPr/>
-                  <p:nvPr/>
-                </p:nvSpPr>
-                <p:spPr>
-                  <a:xfrm>
-                    <a:off x="357351" y="323193"/>
-                    <a:ext cx="11477297" cy="6211614"/>
-                  </a:xfrm>
-                  <a:prstGeom prst="roundRect">
-                    <a:avLst/>
-                  </a:prstGeom>
-                  <a:noFill/>
-                  <a:ln w="254000">
-                    <a:solidFill>
-                      <a:srgbClr val="F6F04D"/>
-                    </a:solidFill>
-                  </a:ln>
-                  <a:scene3d>
-                    <a:camera prst="orthographicFront"/>
-                    <a:lightRig rig="threePt" dir="t"/>
-                  </a:scene3d>
-                  <a:sp3d>
-                    <a:bevelT prst="angle"/>
-                  </a:sp3d>
-                </p:spPr>
-                <p:style>
-                  <a:lnRef idx="2">
-                    <a:schemeClr val="accent1">
-                      <a:shade val="15000"/>
-                    </a:schemeClr>
-                  </a:lnRef>
-                  <a:fillRef idx="1">
-                    <a:schemeClr val="accent1"/>
-                  </a:fillRef>
-                  <a:effectRef idx="0">
-                    <a:schemeClr val="accent1"/>
-                  </a:effectRef>
-                  <a:fontRef idx="minor">
-                    <a:schemeClr val="lt1"/>
-                  </a:fontRef>
-                </p:style>
-                <p:txBody>
-                  <a:bodyPr rtlCol="0" anchor="ctr"/>
-                  <a:lstStyle/>
-                  <a:p>
-                    <a:pPr algn="ctr"/>
-                    <a:endParaRPr lang="id-ID" dirty="0"/>
                   </a:p>
                 </p:txBody>
               </p:sp>
             </p:grpSp>
             <p:sp>
               <p:nvSpPr>
-                <p:cNvPr id="2" name="Multiplication Sign 1">
+                <p:cNvPr id="13" name="TextBox 12">
                   <a:extLst>
                     <a:ext uri="{FF2B5EF4-FFF2-40B4-BE49-F238E27FC236}">
-                      <a16:creationId xmlns:a16="http://schemas.microsoft.com/office/drawing/2014/main" id="{CB07E7CA-6A5E-7812-863A-F7AB742EB355}"/>
+                      <a16:creationId xmlns:a16="http://schemas.microsoft.com/office/drawing/2014/main" id="{4DC7E0CB-447A-177C-92A6-075EE4C09C8D}"/>
                     </a:ext>
                   </a:extLst>
                 </p:cNvPr>
-                <p:cNvSpPr/>
+                <p:cNvSpPr txBox="1"/>
                 <p:nvPr/>
               </p:nvSpPr>
               <p:spPr>
                 <a:xfrm>
-                  <a:off x="10831757" y="737419"/>
-                  <a:ext cx="568746" cy="568746"/>
+                  <a:off x="4600238" y="637071"/>
+                  <a:ext cx="2991525" cy="769441"/>
                 </a:xfrm>
-                <a:prstGeom prst="mathMultiply">
+                <a:prstGeom prst="rect">
                   <a:avLst/>
                 </a:prstGeom>
-                <a:solidFill>
-                  <a:srgbClr val="F5DC76"/>
-                </a:solidFill>
-                <a:ln>
-                  <a:noFill/>
-                </a:ln>
-                <a:effectLst>
-                  <a:glow rad="76200">
-                    <a:srgbClr val="F6F04D">
-                      <a:alpha val="20000"/>
-                    </a:srgbClr>
-                  </a:glow>
-                </a:effectLst>
+                <a:noFill/>
               </p:spPr>
-              <p:style>
-                <a:lnRef idx="2">
-                  <a:schemeClr val="accent1">
-                    <a:shade val="15000"/>
-                  </a:schemeClr>
-                </a:lnRef>
-                <a:fillRef idx="1">
-                  <a:schemeClr val="accent1"/>
-                </a:fillRef>
-                <a:effectRef idx="0">
-                  <a:schemeClr val="accent1"/>
-                </a:effectRef>
-                <a:fontRef idx="minor">
-                  <a:schemeClr val="lt1"/>
-                </a:fontRef>
-              </p:style>
               <p:txBody>
-                <a:bodyPr rtlCol="0" anchor="ctr"/>
+                <a:bodyPr wrap="none" rtlCol="0">
+                  <a:spAutoFit/>
+                </a:bodyPr>
                 <a:lstStyle/>
                 <a:p>
                   <a:pPr algn="ctr"/>
-                  <a:endParaRPr lang="id-ID" dirty="0">
-                    <a:effectLst>
-                      <a:glow rad="139700">
-                        <a:schemeClr val="accent4">
-                          <a:satMod val="175000"/>
-                          <a:alpha val="20000"/>
-                        </a:schemeClr>
-                      </a:glow>
-                    </a:effectLst>
-                  </a:endParaRPr>
-                </a:p>
-              </p:txBody>
-            </p:sp>
-          </p:grpSp>
-          <p:sp>
-            <p:nvSpPr>
-              <p:cNvPr id="13" name="TextBox 12">
-                <a:extLst>
-                  <a:ext uri="{FF2B5EF4-FFF2-40B4-BE49-F238E27FC236}">
-                    <a16:creationId xmlns:a16="http://schemas.microsoft.com/office/drawing/2014/main" id="{4DC7E0CB-447A-177C-92A6-075EE4C09C8D}"/>
-                  </a:ext>
-                </a:extLst>
-              </p:cNvPr>
-              <p:cNvSpPr txBox="1"/>
-              <p:nvPr/>
-            </p:nvSpPr>
-            <p:spPr>
-              <a:xfrm>
-                <a:off x="4600238" y="637071"/>
-                <a:ext cx="2991525" cy="769441"/>
-              </a:xfrm>
-              <a:prstGeom prst="rect">
-                <a:avLst/>
-              </a:prstGeom>
-              <a:noFill/>
-            </p:spPr>
-            <p:txBody>
-              <a:bodyPr wrap="none" rtlCol="0">
-                <a:spAutoFit/>
-              </a:bodyPr>
-              <a:lstStyle/>
-              <a:p>
-                <a:pPr algn="ctr"/>
-                <a:r>
-                  <a:rPr lang="en-US" sz="4400" dirty="0">
+                  <a:r>
+                    <a:rPr lang="en-US" sz="4400" dirty="0">
+                      <a:solidFill>
+                        <a:schemeClr val="bg1"/>
+                      </a:solidFill>
+                      <a:effectLst>
+                        <a:glow rad="139700">
+                          <a:schemeClr val="accent3">
+                            <a:satMod val="175000"/>
+                            <a:alpha val="40000"/>
+                          </a:schemeClr>
+                        </a:glow>
+                      </a:effectLst>
+                      <a:latin typeface="Aharoni" panose="02010803020104030203" pitchFamily="2" charset="-79"/>
+                      <a:cs typeface="Aharoni" panose="02010803020104030203" pitchFamily="2" charset="-79"/>
+                    </a:rPr>
+                    <a:t>PETUNJUK</a:t>
+                  </a:r>
+                  <a:endParaRPr lang="id-ID" sz="4400" dirty="0">
                     <a:solidFill>
                       <a:schemeClr val="bg1"/>
                     </a:solidFill>
@@ -5819,776 +5858,17 @@
                     </a:effectLst>
                     <a:latin typeface="Aharoni" panose="02010803020104030203" pitchFamily="2" charset="-79"/>
                     <a:cs typeface="Aharoni" panose="02010803020104030203" pitchFamily="2" charset="-79"/>
-                  </a:rPr>
-                  <a:t>PETUNJUK</a:t>
-                </a:r>
-                <a:endParaRPr lang="id-ID" sz="4400" dirty="0">
-                  <a:solidFill>
-                    <a:schemeClr val="bg1"/>
-                  </a:solidFill>
-                  <a:effectLst>
-                    <a:glow rad="139700">
-                      <a:schemeClr val="accent3">
-                        <a:satMod val="175000"/>
-                        <a:alpha val="40000"/>
-                      </a:schemeClr>
-                    </a:glow>
-                  </a:effectLst>
-                  <a:latin typeface="Aharoni" panose="02010803020104030203" pitchFamily="2" charset="-79"/>
-                  <a:cs typeface="Aharoni" panose="02010803020104030203" pitchFamily="2" charset="-79"/>
-                </a:endParaRPr>
-              </a:p>
-            </p:txBody>
-          </p:sp>
-        </p:grpSp>
-        <p:grpSp>
-          <p:nvGrpSpPr>
-            <p:cNvPr id="17" name="Group 16">
-              <a:extLst>
-                <a:ext uri="{FF2B5EF4-FFF2-40B4-BE49-F238E27FC236}">
-                  <a16:creationId xmlns:a16="http://schemas.microsoft.com/office/drawing/2014/main" id="{6F9D7E1F-965B-0991-FEAB-74DFEF174BC6}"/>
-                </a:ext>
-              </a:extLst>
-            </p:cNvPr>
-            <p:cNvGrpSpPr/>
-            <p:nvPr/>
-          </p:nvGrpSpPr>
-          <p:grpSpPr>
-            <a:xfrm>
-              <a:off x="2438400" y="5114099"/>
-              <a:ext cx="7315200" cy="1213946"/>
-              <a:chOff x="3610303" y="4035972"/>
-              <a:chExt cx="7315200" cy="1213946"/>
-            </a:xfrm>
-          </p:grpSpPr>
-          <p:pic>
-            <p:nvPicPr>
-              <p:cNvPr id="15" name="Picture 14">
+                  </a:endParaRPr>
+                </a:p>
+              </p:txBody>
+            </p:sp>
+          </p:grpSp>
+          <p:grpSp>
+            <p:nvGrpSpPr>
+              <p:cNvPr id="17" name="Group 16">
                 <a:extLst>
                   <a:ext uri="{FF2B5EF4-FFF2-40B4-BE49-F238E27FC236}">
-                    <a16:creationId xmlns:a16="http://schemas.microsoft.com/office/drawing/2014/main" id="{05FC9464-2274-58A1-79A5-2B961E9ED8A6}"/>
-                  </a:ext>
-                </a:extLst>
-              </p:cNvPr>
-              <p:cNvPicPr>
-                <a:picLocks noChangeAspect="1"/>
-              </p:cNvPicPr>
-              <p:nvPr/>
-            </p:nvPicPr>
-            <p:blipFill rotWithShape="1">
-              <a:blip r:embed="rId2">
-                <a:extLst>
-                  <a:ext uri="{28A0092B-C50C-407E-A947-70E740481C1C}">
-                    <a14:useLocalDpi xmlns:a14="http://schemas.microsoft.com/office/drawing/2010/main" val="0"/>
-                  </a:ext>
-                </a:extLst>
-              </a:blip>
-              <a:srcRect l="26990" t="14683" r="26882" b="16796"/>
-              <a:stretch/>
-            </p:blipFill>
-            <p:spPr>
-              <a:xfrm>
-                <a:off x="3610303" y="4035972"/>
-                <a:ext cx="1340069" cy="1213946"/>
-              </a:xfrm>
-              <a:prstGeom prst="rect">
-                <a:avLst/>
-              </a:prstGeom>
-              <a:effectLst>
-                <a:outerShdw blurRad="50800" dist="38100" dir="5400000" algn="t" rotWithShape="0">
-                  <a:prstClr val="black">
-                    <a:alpha val="40000"/>
-                  </a:prstClr>
-                </a:outerShdw>
-              </a:effectLst>
-            </p:spPr>
-          </p:pic>
-          <p:sp>
-            <p:nvSpPr>
-              <p:cNvPr id="16" name="TextBox 15">
-                <a:extLst>
-                  <a:ext uri="{FF2B5EF4-FFF2-40B4-BE49-F238E27FC236}">
-                    <a16:creationId xmlns:a16="http://schemas.microsoft.com/office/drawing/2014/main" id="{4F1AA1C2-2024-1CD2-7955-35E979A33537}"/>
-                  </a:ext>
-                </a:extLst>
-              </p:cNvPr>
-              <p:cNvSpPr txBox="1"/>
-              <p:nvPr/>
-            </p:nvSpPr>
-            <p:spPr>
-              <a:xfrm>
-                <a:off x="5069870" y="4207917"/>
-                <a:ext cx="5855633" cy="923330"/>
-              </a:xfrm>
-              <a:prstGeom prst="rect">
-                <a:avLst/>
-              </a:prstGeom>
-              <a:noFill/>
-            </p:spPr>
-            <p:txBody>
-              <a:bodyPr wrap="square" rtlCol="0">
-                <a:spAutoFit/>
-              </a:bodyPr>
-              <a:lstStyle/>
-              <a:p>
-                <a:pPr>
-                  <a:spcAft>
-                    <a:spcPts val="1200"/>
-                  </a:spcAft>
-                </a:pPr>
-                <a:r>
-                  <a:rPr lang="en-US" b="1" dirty="0" err="1">
-                    <a:solidFill>
-                      <a:schemeClr val="bg1"/>
-                    </a:solidFill>
-                    <a:latin typeface="Dubai Light" panose="020B0303030403030204" pitchFamily="34" charset="-78"/>
-                    <a:cs typeface="Dubai Light" panose="020B0303030403030204" pitchFamily="34" charset="-78"/>
-                  </a:rPr>
-                  <a:t>Objektif</a:t>
-                </a:r>
-                <a:r>
-                  <a:rPr lang="en-US" b="1" dirty="0">
-                    <a:solidFill>
-                      <a:schemeClr val="bg1"/>
-                    </a:solidFill>
-                    <a:latin typeface="Dubai Light" panose="020B0303030403030204" pitchFamily="34" charset="-78"/>
-                    <a:cs typeface="Dubai Light" panose="020B0303030403030204" pitchFamily="34" charset="-78"/>
-                  </a:rPr>
-                  <a:t>:</a:t>
-                </a:r>
-                <a:br>
-                  <a:rPr lang="en-US" b="1" dirty="0">
-                    <a:solidFill>
-                      <a:schemeClr val="bg1"/>
-                    </a:solidFill>
-                    <a:latin typeface="Dubai Light" panose="020B0303030403030204" pitchFamily="34" charset="-78"/>
-                    <a:cs typeface="Dubai Light" panose="020B0303030403030204" pitchFamily="34" charset="-78"/>
-                  </a:rPr>
-                </a:br>
-                <a:r>
-                  <a:rPr lang="en-US" dirty="0" err="1">
-                    <a:solidFill>
-                      <a:schemeClr val="bg1"/>
-                    </a:solidFill>
-                    <a:latin typeface="Dubai Light" panose="020B0303030403030204" pitchFamily="34" charset="-78"/>
-                    <a:cs typeface="Dubai Light" panose="020B0303030403030204" pitchFamily="34" charset="-78"/>
-                  </a:rPr>
-                  <a:t>Kumpulkan</a:t>
-                </a:r>
-                <a:r>
-                  <a:rPr lang="en-US" dirty="0">
-                    <a:solidFill>
-                      <a:schemeClr val="bg1"/>
-                    </a:solidFill>
-                    <a:latin typeface="Dubai Light" panose="020B0303030403030204" pitchFamily="34" charset="-78"/>
-                    <a:cs typeface="Dubai Light" panose="020B0303030403030204" pitchFamily="34" charset="-78"/>
-                  </a:rPr>
-                  <a:t> </a:t>
-                </a:r>
-                <a:r>
-                  <a:rPr lang="en-US" dirty="0" err="1">
-                    <a:solidFill>
-                      <a:schemeClr val="bg1"/>
-                    </a:solidFill>
-                    <a:latin typeface="Dubai Light" panose="020B0303030403030204" pitchFamily="34" charset="-78"/>
-                    <a:cs typeface="Dubai Light" panose="020B0303030403030204" pitchFamily="34" charset="-78"/>
-                  </a:rPr>
-                  <a:t>kotak</a:t>
-                </a:r>
-                <a:r>
-                  <a:rPr lang="en-US" dirty="0">
-                    <a:solidFill>
-                      <a:schemeClr val="bg1"/>
-                    </a:solidFill>
-                    <a:latin typeface="Dubai Light" panose="020B0303030403030204" pitchFamily="34" charset="-78"/>
-                    <a:cs typeface="Dubai Light" panose="020B0303030403030204" pitchFamily="34" charset="-78"/>
-                  </a:rPr>
-                  <a:t> </a:t>
-                </a:r>
-                <a:r>
-                  <a:rPr lang="en-US" dirty="0" err="1">
-                    <a:solidFill>
-                      <a:schemeClr val="bg1"/>
-                    </a:solidFill>
-                    <a:latin typeface="Dubai Light" panose="020B0303030403030204" pitchFamily="34" charset="-78"/>
-                    <a:cs typeface="Dubai Light" panose="020B0303030403030204" pitchFamily="34" charset="-78"/>
-                  </a:rPr>
-                  <a:t>berwarna</a:t>
-                </a:r>
-                <a:r>
-                  <a:rPr lang="en-US" dirty="0">
-                    <a:solidFill>
-                      <a:schemeClr val="bg1"/>
-                    </a:solidFill>
-                    <a:latin typeface="Dubai Light" panose="020B0303030403030204" pitchFamily="34" charset="-78"/>
-                    <a:cs typeface="Dubai Light" panose="020B0303030403030204" pitchFamily="34" charset="-78"/>
-                  </a:rPr>
-                  <a:t> </a:t>
-                </a:r>
-                <a:r>
-                  <a:rPr lang="en-US" dirty="0" err="1">
-                    <a:solidFill>
-                      <a:schemeClr val="bg1"/>
-                    </a:solidFill>
-                    <a:latin typeface="Dubai Light" panose="020B0303030403030204" pitchFamily="34" charset="-78"/>
-                    <a:cs typeface="Dubai Light" panose="020B0303030403030204" pitchFamily="34" charset="-78"/>
-                  </a:rPr>
-                  <a:t>merah</a:t>
-                </a:r>
-                <a:r>
-                  <a:rPr lang="en-US" dirty="0">
-                    <a:solidFill>
-                      <a:schemeClr val="bg1"/>
-                    </a:solidFill>
-                    <a:latin typeface="Dubai Light" panose="020B0303030403030204" pitchFamily="34" charset="-78"/>
-                    <a:cs typeface="Dubai Light" panose="020B0303030403030204" pitchFamily="34" charset="-78"/>
-                  </a:rPr>
-                  <a:t> </a:t>
-                </a:r>
-                <a:r>
-                  <a:rPr lang="en-US" dirty="0" err="1">
-                    <a:solidFill>
-                      <a:schemeClr val="bg1"/>
-                    </a:solidFill>
-                    <a:latin typeface="Dubai Light" panose="020B0303030403030204" pitchFamily="34" charset="-78"/>
-                    <a:cs typeface="Dubai Light" panose="020B0303030403030204" pitchFamily="34" charset="-78"/>
-                  </a:rPr>
-                  <a:t>dengan</a:t>
-                </a:r>
-                <a:r>
-                  <a:rPr lang="en-US" dirty="0">
-                    <a:solidFill>
-                      <a:schemeClr val="bg1"/>
-                    </a:solidFill>
-                    <a:latin typeface="Dubai Light" panose="020B0303030403030204" pitchFamily="34" charset="-78"/>
-                    <a:cs typeface="Dubai Light" panose="020B0303030403030204" pitchFamily="34" charset="-78"/>
-                  </a:rPr>
-                  <a:t> </a:t>
-                </a:r>
-                <a:r>
-                  <a:rPr lang="en-US" dirty="0" err="1">
-                    <a:solidFill>
-                      <a:schemeClr val="bg1"/>
-                    </a:solidFill>
-                    <a:latin typeface="Dubai Light" panose="020B0303030403030204" pitchFamily="34" charset="-78"/>
-                    <a:cs typeface="Dubai Light" panose="020B0303030403030204" pitchFamily="34" charset="-78"/>
-                  </a:rPr>
-                  <a:t>cara</a:t>
-                </a:r>
-                <a:r>
-                  <a:rPr lang="en-US" dirty="0">
-                    <a:solidFill>
-                      <a:schemeClr val="bg1"/>
-                    </a:solidFill>
-                    <a:latin typeface="Dubai Light" panose="020B0303030403030204" pitchFamily="34" charset="-78"/>
-                    <a:cs typeface="Dubai Light" panose="020B0303030403030204" pitchFamily="34" charset="-78"/>
-                  </a:rPr>
-                  <a:t> </a:t>
-                </a:r>
-                <a:r>
-                  <a:rPr lang="en-US" dirty="0" err="1">
-                    <a:solidFill>
-                      <a:schemeClr val="bg1"/>
-                    </a:solidFill>
-                    <a:latin typeface="Dubai Light" panose="020B0303030403030204" pitchFamily="34" charset="-78"/>
-                    <a:cs typeface="Dubai Light" panose="020B0303030403030204" pitchFamily="34" charset="-78"/>
-                  </a:rPr>
-                  <a:t>mendekatinya</a:t>
-                </a:r>
-                <a:r>
-                  <a:rPr lang="en-US" dirty="0">
-                    <a:solidFill>
-                      <a:schemeClr val="bg1"/>
-                    </a:solidFill>
-                    <a:latin typeface="Dubai Light" panose="020B0303030403030204" pitchFamily="34" charset="-78"/>
-                    <a:cs typeface="Dubai Light" panose="020B0303030403030204" pitchFamily="34" charset="-78"/>
-                  </a:rPr>
-                  <a:t>.</a:t>
-                </a:r>
-                <a:br>
-                  <a:rPr lang="en-US" dirty="0">
-                    <a:solidFill>
-                      <a:schemeClr val="bg1"/>
-                    </a:solidFill>
-                    <a:latin typeface="Dubai Light" panose="020B0303030403030204" pitchFamily="34" charset="-78"/>
-                    <a:cs typeface="Dubai Light" panose="020B0303030403030204" pitchFamily="34" charset="-78"/>
-                  </a:rPr>
-                </a:br>
-                <a:r>
-                  <a:rPr lang="en-US" dirty="0" err="1">
-                    <a:solidFill>
-                      <a:schemeClr val="bg1"/>
-                    </a:solidFill>
-                    <a:latin typeface="Dubai Light" panose="020B0303030403030204" pitchFamily="34" charset="-78"/>
-                    <a:cs typeface="Dubai Light" panose="020B0303030403030204" pitchFamily="34" charset="-78"/>
-                  </a:rPr>
-                  <a:t>Kumpulkan</a:t>
-                </a:r>
-                <a:r>
-                  <a:rPr lang="en-US" dirty="0">
-                    <a:solidFill>
-                      <a:schemeClr val="bg1"/>
-                    </a:solidFill>
-                    <a:latin typeface="Dubai Light" panose="020B0303030403030204" pitchFamily="34" charset="-78"/>
-                    <a:cs typeface="Dubai Light" panose="020B0303030403030204" pitchFamily="34" charset="-78"/>
-                  </a:rPr>
-                  <a:t> sebelum </a:t>
-                </a:r>
-                <a:r>
-                  <a:rPr lang="en-US" dirty="0" err="1">
-                    <a:solidFill>
-                      <a:schemeClr val="bg1"/>
-                    </a:solidFill>
-                    <a:latin typeface="Dubai Light" panose="020B0303030403030204" pitchFamily="34" charset="-78"/>
-                    <a:cs typeface="Dubai Light" panose="020B0303030403030204" pitchFamily="34" charset="-78"/>
-                  </a:rPr>
-                  <a:t>waktu</a:t>
-                </a:r>
-                <a:r>
-                  <a:rPr lang="en-US" dirty="0">
-                    <a:solidFill>
-                      <a:schemeClr val="bg1"/>
-                    </a:solidFill>
-                    <a:latin typeface="Dubai Light" panose="020B0303030403030204" pitchFamily="34" charset="-78"/>
-                    <a:cs typeface="Dubai Light" panose="020B0303030403030204" pitchFamily="34" charset="-78"/>
-                  </a:rPr>
-                  <a:t> </a:t>
-                </a:r>
-                <a:r>
-                  <a:rPr lang="en-US" dirty="0" err="1">
-                    <a:solidFill>
-                      <a:schemeClr val="bg1"/>
-                    </a:solidFill>
-                    <a:latin typeface="Dubai Light" panose="020B0303030403030204" pitchFamily="34" charset="-78"/>
-                    <a:cs typeface="Dubai Light" panose="020B0303030403030204" pitchFamily="34" charset="-78"/>
-                  </a:rPr>
-                  <a:t>habis</a:t>
-                </a:r>
-                <a:r>
-                  <a:rPr lang="en-US" dirty="0">
-                    <a:solidFill>
-                      <a:schemeClr val="bg1"/>
-                    </a:solidFill>
-                    <a:latin typeface="Dubai Light" panose="020B0303030403030204" pitchFamily="34" charset="-78"/>
-                    <a:cs typeface="Dubai Light" panose="020B0303030403030204" pitchFamily="34" charset="-78"/>
-                  </a:rPr>
-                  <a:t>.</a:t>
-                </a:r>
-                <a:endParaRPr lang="id-ID" dirty="0">
-                  <a:solidFill>
-                    <a:schemeClr val="bg1"/>
-                  </a:solidFill>
-                  <a:latin typeface="Dubai Light" panose="020B0303030403030204" pitchFamily="34" charset="-78"/>
-                  <a:cs typeface="Dubai Light" panose="020B0303030403030204" pitchFamily="34" charset="-78"/>
-                </a:endParaRPr>
-              </a:p>
-            </p:txBody>
-          </p:sp>
-        </p:grpSp>
-        <p:grpSp>
-          <p:nvGrpSpPr>
-            <p:cNvPr id="49" name="Group 48">
-              <a:extLst>
-                <a:ext uri="{FF2B5EF4-FFF2-40B4-BE49-F238E27FC236}">
-                  <a16:creationId xmlns:a16="http://schemas.microsoft.com/office/drawing/2014/main" id="{758B6F2B-5447-62D5-D6DB-CB0D259719EB}"/>
-                </a:ext>
-              </a:extLst>
-            </p:cNvPr>
-            <p:cNvGrpSpPr/>
-            <p:nvPr/>
-          </p:nvGrpSpPr>
-          <p:grpSpPr>
-            <a:xfrm>
-              <a:off x="1087402" y="4114128"/>
-              <a:ext cx="5758487" cy="671731"/>
-              <a:chOff x="1173188" y="3421861"/>
-              <a:chExt cx="5758487" cy="671731"/>
-            </a:xfrm>
-          </p:grpSpPr>
-          <p:sp>
-            <p:nvSpPr>
-              <p:cNvPr id="43" name="TextBox 42">
-                <a:extLst>
-                  <a:ext uri="{FF2B5EF4-FFF2-40B4-BE49-F238E27FC236}">
-                    <a16:creationId xmlns:a16="http://schemas.microsoft.com/office/drawing/2014/main" id="{7F4AD9AA-DBC3-5625-3F3E-F20857AF73D9}"/>
-                  </a:ext>
-                </a:extLst>
-              </p:cNvPr>
-              <p:cNvSpPr txBox="1"/>
-              <p:nvPr/>
-            </p:nvSpPr>
-            <p:spPr>
-              <a:xfrm>
-                <a:off x="3444322" y="3447261"/>
-                <a:ext cx="3487353" cy="646331"/>
-              </a:xfrm>
-              <a:prstGeom prst="rect">
-                <a:avLst/>
-              </a:prstGeom>
-              <a:noFill/>
-            </p:spPr>
-            <p:txBody>
-              <a:bodyPr wrap="square" rtlCol="0">
-                <a:spAutoFit/>
-              </a:bodyPr>
-              <a:lstStyle/>
-              <a:p>
-                <a:pPr>
-                  <a:spcAft>
-                    <a:spcPts val="1200"/>
-                  </a:spcAft>
-                </a:pPr>
-                <a:r>
-                  <a:rPr lang="en-US" b="1" dirty="0" err="1">
-                    <a:solidFill>
-                      <a:schemeClr val="bg1"/>
-                    </a:solidFill>
-                    <a:latin typeface="Dubai Light" panose="020B0303030403030204" pitchFamily="34" charset="-78"/>
-                    <a:cs typeface="Dubai Light" panose="020B0303030403030204" pitchFamily="34" charset="-78"/>
-                  </a:rPr>
-                  <a:t>Melompat</a:t>
-                </a:r>
-                <a:r>
-                  <a:rPr lang="en-US" b="1" dirty="0">
-                    <a:solidFill>
-                      <a:schemeClr val="bg1"/>
-                    </a:solidFill>
-                    <a:latin typeface="Dubai Light" panose="020B0303030403030204" pitchFamily="34" charset="-78"/>
-                    <a:cs typeface="Dubai Light" panose="020B0303030403030204" pitchFamily="34" charset="-78"/>
-                  </a:rPr>
-                  <a:t>:</a:t>
-                </a:r>
-                <a:br>
-                  <a:rPr lang="en-US" b="1" dirty="0">
-                    <a:solidFill>
-                      <a:schemeClr val="bg1"/>
-                    </a:solidFill>
-                    <a:latin typeface="Dubai Light" panose="020B0303030403030204" pitchFamily="34" charset="-78"/>
-                    <a:cs typeface="Dubai Light" panose="020B0303030403030204" pitchFamily="34" charset="-78"/>
-                  </a:rPr>
-                </a:br>
-                <a:r>
-                  <a:rPr lang="en-US" dirty="0" err="1">
-                    <a:solidFill>
-                      <a:schemeClr val="bg1"/>
-                    </a:solidFill>
-                    <a:latin typeface="Dubai Light" panose="020B0303030403030204" pitchFamily="34" charset="-78"/>
-                    <a:cs typeface="Dubai Light" panose="020B0303030403030204" pitchFamily="34" charset="-78"/>
-                  </a:rPr>
-                  <a:t>Gunakan</a:t>
-                </a:r>
-                <a:r>
-                  <a:rPr lang="en-US" dirty="0">
-                    <a:solidFill>
-                      <a:schemeClr val="bg1"/>
-                    </a:solidFill>
-                    <a:latin typeface="Dubai Light" panose="020B0303030403030204" pitchFamily="34" charset="-78"/>
-                    <a:cs typeface="Dubai Light" panose="020B0303030403030204" pitchFamily="34" charset="-78"/>
-                  </a:rPr>
-                  <a:t> </a:t>
-                </a:r>
-                <a:r>
-                  <a:rPr lang="en-US" b="1" dirty="0">
-                    <a:solidFill>
-                      <a:schemeClr val="bg1"/>
-                    </a:solidFill>
-                    <a:latin typeface="Dubai Light" panose="020B0303030403030204" pitchFamily="34" charset="-78"/>
-                    <a:cs typeface="Dubai Light" panose="020B0303030403030204" pitchFamily="34" charset="-78"/>
-                  </a:rPr>
-                  <a:t>Spacebar</a:t>
-                </a:r>
-                <a:r>
-                  <a:rPr lang="en-US" dirty="0">
-                    <a:solidFill>
-                      <a:schemeClr val="bg1"/>
-                    </a:solidFill>
-                    <a:latin typeface="Dubai Light" panose="020B0303030403030204" pitchFamily="34" charset="-78"/>
-                    <a:cs typeface="Dubai Light" panose="020B0303030403030204" pitchFamily="34" charset="-78"/>
-                  </a:rPr>
-                  <a:t> untuk </a:t>
-                </a:r>
-                <a:r>
-                  <a:rPr lang="en-US" dirty="0" err="1">
-                    <a:solidFill>
-                      <a:schemeClr val="bg1"/>
-                    </a:solidFill>
-                    <a:latin typeface="Dubai Light" panose="020B0303030403030204" pitchFamily="34" charset="-78"/>
-                    <a:cs typeface="Dubai Light" panose="020B0303030403030204" pitchFamily="34" charset="-78"/>
-                  </a:rPr>
-                  <a:t>melompat</a:t>
-                </a:r>
-                <a:r>
-                  <a:rPr lang="en-US" dirty="0">
-                    <a:solidFill>
-                      <a:schemeClr val="bg1"/>
-                    </a:solidFill>
-                    <a:latin typeface="Dubai Light" panose="020B0303030403030204" pitchFamily="34" charset="-78"/>
-                    <a:cs typeface="Dubai Light" panose="020B0303030403030204" pitchFamily="34" charset="-78"/>
-                  </a:rPr>
-                  <a:t>.</a:t>
-                </a:r>
-                <a:endParaRPr lang="id-ID" dirty="0">
-                  <a:solidFill>
-                    <a:schemeClr val="bg1"/>
-                  </a:solidFill>
-                  <a:latin typeface="Dubai Light" panose="020B0303030403030204" pitchFamily="34" charset="-78"/>
-                  <a:cs typeface="Dubai Light" panose="020B0303030403030204" pitchFamily="34" charset="-78"/>
-                </a:endParaRPr>
-              </a:p>
-            </p:txBody>
-          </p:sp>
-          <p:pic>
-            <p:nvPicPr>
-              <p:cNvPr id="47" name="Picture 46">
-                <a:extLst>
-                  <a:ext uri="{FF2B5EF4-FFF2-40B4-BE49-F238E27FC236}">
-                    <a16:creationId xmlns:a16="http://schemas.microsoft.com/office/drawing/2014/main" id="{DC88A2BA-BA38-A50A-5426-5A0A2A165C70}"/>
-                  </a:ext>
-                </a:extLst>
-              </p:cNvPr>
-              <p:cNvPicPr>
-                <a:picLocks noChangeAspect="1"/>
-              </p:cNvPicPr>
-              <p:nvPr/>
-            </p:nvPicPr>
-            <p:blipFill>
-              <a:blip r:embed="rId3">
-                <a:extLst>
-                  <a:ext uri="{28A0092B-C50C-407E-A947-70E740481C1C}">
-                    <a14:useLocalDpi xmlns:a14="http://schemas.microsoft.com/office/drawing/2010/main" val="0"/>
-                  </a:ext>
-                </a:extLst>
-              </a:blip>
-              <a:stretch>
-                <a:fillRect/>
-              </a:stretch>
-            </p:blipFill>
-            <p:spPr>
-              <a:xfrm>
-                <a:off x="1173188" y="3421861"/>
-                <a:ext cx="2271134" cy="646331"/>
-              </a:xfrm>
-              <a:prstGeom prst="rect">
-                <a:avLst/>
-              </a:prstGeom>
-            </p:spPr>
-          </p:pic>
-        </p:grpSp>
-        <p:grpSp>
-          <p:nvGrpSpPr>
-            <p:cNvPr id="57" name="Group 56">
-              <a:extLst>
-                <a:ext uri="{FF2B5EF4-FFF2-40B4-BE49-F238E27FC236}">
-                  <a16:creationId xmlns:a16="http://schemas.microsoft.com/office/drawing/2014/main" id="{DB848B1A-6F03-C22B-2611-1F1AC4310916}"/>
-                </a:ext>
-              </a:extLst>
-            </p:cNvPr>
-            <p:cNvGrpSpPr/>
-            <p:nvPr/>
-          </p:nvGrpSpPr>
-          <p:grpSpPr>
-            <a:xfrm>
-              <a:off x="1087402" y="3368228"/>
-              <a:ext cx="4892662" cy="672566"/>
-              <a:chOff x="1173188" y="3840438"/>
-              <a:chExt cx="4892662" cy="672566"/>
-            </a:xfrm>
-          </p:grpSpPr>
-          <p:pic>
-            <p:nvPicPr>
-              <p:cNvPr id="54" name="Picture 53">
-                <a:extLst>
-                  <a:ext uri="{FF2B5EF4-FFF2-40B4-BE49-F238E27FC236}">
-                    <a16:creationId xmlns:a16="http://schemas.microsoft.com/office/drawing/2014/main" id="{DD4FAE06-D817-0FE5-A124-A38A1F727C62}"/>
-                  </a:ext>
-                </a:extLst>
-              </p:cNvPr>
-              <p:cNvPicPr>
-                <a:picLocks noChangeAspect="1"/>
-              </p:cNvPicPr>
-              <p:nvPr/>
-            </p:nvPicPr>
-            <p:blipFill>
-              <a:blip r:embed="rId4">
-                <a:extLst>
-                  <a:ext uri="{28A0092B-C50C-407E-A947-70E740481C1C}">
-                    <a14:useLocalDpi xmlns:a14="http://schemas.microsoft.com/office/drawing/2010/main" val="0"/>
-                  </a:ext>
-                </a:extLst>
-              </a:blip>
-              <a:stretch>
-                <a:fillRect/>
-              </a:stretch>
-            </p:blipFill>
-            <p:spPr>
-              <a:xfrm>
-                <a:off x="1173188" y="3840438"/>
-                <a:ext cx="2276999" cy="648000"/>
-              </a:xfrm>
-              <a:prstGeom prst="rect">
-                <a:avLst/>
-              </a:prstGeom>
-            </p:spPr>
-          </p:pic>
-          <p:sp>
-            <p:nvSpPr>
-              <p:cNvPr id="56" name="TextBox 55">
-                <a:extLst>
-                  <a:ext uri="{FF2B5EF4-FFF2-40B4-BE49-F238E27FC236}">
-                    <a16:creationId xmlns:a16="http://schemas.microsoft.com/office/drawing/2014/main" id="{73A79892-97AC-0265-4DB7-027D220934F4}"/>
-                  </a:ext>
-                </a:extLst>
-              </p:cNvPr>
-              <p:cNvSpPr txBox="1"/>
-              <p:nvPr/>
-            </p:nvSpPr>
-            <p:spPr>
-              <a:xfrm>
-                <a:off x="3444322" y="3866673"/>
-                <a:ext cx="2621528" cy="646331"/>
-              </a:xfrm>
-              <a:prstGeom prst="rect">
-                <a:avLst/>
-              </a:prstGeom>
-              <a:noFill/>
-            </p:spPr>
-            <p:txBody>
-              <a:bodyPr wrap="square" rtlCol="0">
-                <a:spAutoFit/>
-              </a:bodyPr>
-              <a:lstStyle/>
-              <a:p>
-                <a:pPr>
-                  <a:spcAft>
-                    <a:spcPts val="1200"/>
-                  </a:spcAft>
-                </a:pPr>
-                <a:r>
-                  <a:rPr lang="en-US" b="1" dirty="0" err="1">
-                    <a:solidFill>
-                      <a:schemeClr val="bg1"/>
-                    </a:solidFill>
-                    <a:latin typeface="Dubai Light" panose="020B0303030403030204" pitchFamily="34" charset="-78"/>
-                    <a:cs typeface="Dubai Light" panose="020B0303030403030204" pitchFamily="34" charset="-78"/>
-                  </a:rPr>
-                  <a:t>Berlari</a:t>
-                </a:r>
-                <a:r>
-                  <a:rPr lang="en-US" b="1" dirty="0">
-                    <a:solidFill>
-                      <a:schemeClr val="bg1"/>
-                    </a:solidFill>
-                    <a:latin typeface="Dubai Light" panose="020B0303030403030204" pitchFamily="34" charset="-78"/>
-                    <a:cs typeface="Dubai Light" panose="020B0303030403030204" pitchFamily="34" charset="-78"/>
-                  </a:rPr>
-                  <a:t>:</a:t>
-                </a:r>
-                <a:br>
-                  <a:rPr lang="en-US" b="1" dirty="0">
-                    <a:solidFill>
-                      <a:schemeClr val="bg1"/>
-                    </a:solidFill>
-                    <a:latin typeface="Dubai Light" panose="020B0303030403030204" pitchFamily="34" charset="-78"/>
-                    <a:cs typeface="Dubai Light" panose="020B0303030403030204" pitchFamily="34" charset="-78"/>
-                  </a:rPr>
-                </a:br>
-                <a:r>
-                  <a:rPr lang="en-US" dirty="0" err="1">
-                    <a:solidFill>
-                      <a:schemeClr val="bg1"/>
-                    </a:solidFill>
-                    <a:latin typeface="Dubai Light" panose="020B0303030403030204" pitchFamily="34" charset="-78"/>
-                    <a:cs typeface="Dubai Light" panose="020B0303030403030204" pitchFamily="34" charset="-78"/>
-                  </a:rPr>
-                  <a:t>Tekan</a:t>
-                </a:r>
-                <a:r>
-                  <a:rPr lang="en-US" dirty="0">
-                    <a:solidFill>
-                      <a:schemeClr val="bg1"/>
-                    </a:solidFill>
-                    <a:latin typeface="Dubai Light" panose="020B0303030403030204" pitchFamily="34" charset="-78"/>
-                    <a:cs typeface="Dubai Light" panose="020B0303030403030204" pitchFamily="34" charset="-78"/>
-                  </a:rPr>
-                  <a:t> </a:t>
-                </a:r>
-                <a:r>
-                  <a:rPr lang="en-US" b="1" dirty="0">
-                    <a:solidFill>
-                      <a:schemeClr val="bg1"/>
-                    </a:solidFill>
-                    <a:latin typeface="Dubai Light" panose="020B0303030403030204" pitchFamily="34" charset="-78"/>
-                    <a:cs typeface="Dubai Light" panose="020B0303030403030204" pitchFamily="34" charset="-78"/>
-                  </a:rPr>
-                  <a:t>Shift</a:t>
-                </a:r>
-                <a:r>
-                  <a:rPr lang="en-US" dirty="0">
-                    <a:solidFill>
-                      <a:schemeClr val="bg1"/>
-                    </a:solidFill>
-                    <a:latin typeface="Dubai Light" panose="020B0303030403030204" pitchFamily="34" charset="-78"/>
-                    <a:cs typeface="Dubai Light" panose="020B0303030403030204" pitchFamily="34" charset="-78"/>
-                  </a:rPr>
-                  <a:t> untuk </a:t>
-                </a:r>
-                <a:r>
-                  <a:rPr lang="en-US" dirty="0" err="1">
-                    <a:solidFill>
-                      <a:schemeClr val="bg1"/>
-                    </a:solidFill>
-                    <a:latin typeface="Dubai Light" panose="020B0303030403030204" pitchFamily="34" charset="-78"/>
-                    <a:cs typeface="Dubai Light" panose="020B0303030403030204" pitchFamily="34" charset="-78"/>
-                  </a:rPr>
-                  <a:t>berlari</a:t>
-                </a:r>
-                <a:r>
-                  <a:rPr lang="en-US" dirty="0">
-                    <a:solidFill>
-                      <a:schemeClr val="bg1"/>
-                    </a:solidFill>
-                    <a:latin typeface="Dubai Light" panose="020B0303030403030204" pitchFamily="34" charset="-78"/>
-                    <a:cs typeface="Dubai Light" panose="020B0303030403030204" pitchFamily="34" charset="-78"/>
-                  </a:rPr>
-                  <a:t>.</a:t>
-                </a:r>
-                <a:endParaRPr lang="id-ID" dirty="0">
-                  <a:solidFill>
-                    <a:schemeClr val="bg1"/>
-                  </a:solidFill>
-                  <a:latin typeface="Dubai Light" panose="020B0303030403030204" pitchFamily="34" charset="-78"/>
-                  <a:cs typeface="Dubai Light" panose="020B0303030403030204" pitchFamily="34" charset="-78"/>
-                </a:endParaRPr>
-              </a:p>
-            </p:txBody>
-          </p:sp>
-        </p:grpSp>
-        <p:grpSp>
-          <p:nvGrpSpPr>
-            <p:cNvPr id="80" name="Group 79">
-              <a:extLst>
-                <a:ext uri="{FF2B5EF4-FFF2-40B4-BE49-F238E27FC236}">
-                  <a16:creationId xmlns:a16="http://schemas.microsoft.com/office/drawing/2014/main" id="{D5A36018-8BDD-BD95-366B-4F8459B67EE1}"/>
-                </a:ext>
-              </a:extLst>
-            </p:cNvPr>
-            <p:cNvGrpSpPr/>
-            <p:nvPr/>
-          </p:nvGrpSpPr>
-          <p:grpSpPr>
-            <a:xfrm>
-              <a:off x="784725" y="1356489"/>
-              <a:ext cx="5720790" cy="1887796"/>
-              <a:chOff x="870511" y="1191389"/>
-              <a:chExt cx="5720790" cy="1887796"/>
-            </a:xfrm>
-          </p:grpSpPr>
-          <p:grpSp>
-            <p:nvGrpSpPr>
-              <p:cNvPr id="50" name="Group 49">
-                <a:extLst>
-                  <a:ext uri="{FF2B5EF4-FFF2-40B4-BE49-F238E27FC236}">
-                    <a16:creationId xmlns:a16="http://schemas.microsoft.com/office/drawing/2014/main" id="{86EA0678-141B-3D4D-5EBB-E2FCC4EE3855}"/>
+                    <a16:creationId xmlns:a16="http://schemas.microsoft.com/office/drawing/2014/main" id="{6F9D7E1F-965B-0991-FEAB-74DFEF174BC6}"/>
                   </a:ext>
                 </a:extLst>
               </p:cNvPr>
@@ -6597,18 +5877,60 @@
             </p:nvGrpSpPr>
             <p:grpSpPr>
               <a:xfrm>
-                <a:off x="1191045" y="1432176"/>
-                <a:ext cx="5400256" cy="1413341"/>
-                <a:chOff x="1191045" y="1740606"/>
-                <a:chExt cx="5400256" cy="1413341"/>
+                <a:off x="1098330" y="5114099"/>
+                <a:ext cx="5747559" cy="1213946"/>
+                <a:chOff x="2270233" y="4035972"/>
+                <a:chExt cx="5747559" cy="1213946"/>
               </a:xfrm>
             </p:grpSpPr>
+            <p:pic>
+              <p:nvPicPr>
+                <p:cNvPr id="15" name="Picture 14">
+                  <a:extLst>
+                    <a:ext uri="{FF2B5EF4-FFF2-40B4-BE49-F238E27FC236}">
+                      <a16:creationId xmlns:a16="http://schemas.microsoft.com/office/drawing/2014/main" id="{05FC9464-2274-58A1-79A5-2B961E9ED8A6}"/>
+                    </a:ext>
+                  </a:extLst>
+                </p:cNvPr>
+                <p:cNvPicPr>
+                  <a:picLocks noChangeAspect="1"/>
+                </p:cNvPicPr>
+                <p:nvPr/>
+              </p:nvPicPr>
+              <p:blipFill rotWithShape="1">
+                <a:blip r:embed="rId2">
+                  <a:extLst>
+                    <a:ext uri="{28A0092B-C50C-407E-A947-70E740481C1C}">
+                      <a14:useLocalDpi xmlns:a14="http://schemas.microsoft.com/office/drawing/2010/main" val="0"/>
+                    </a:ext>
+                  </a:extLst>
+                </a:blip>
+                <a:srcRect l="26990" t="14683" r="26882" b="16796"/>
+                <a:stretch/>
+              </p:blipFill>
+              <p:spPr>
+                <a:xfrm>
+                  <a:off x="2270233" y="4035972"/>
+                  <a:ext cx="1340069" cy="1213946"/>
+                </a:xfrm>
+                <a:prstGeom prst="rect">
+                  <a:avLst/>
+                </a:prstGeom>
+                <a:effectLst>
+                  <a:outerShdw blurRad="50800" dist="38100" dir="5400000" algn="t" rotWithShape="0">
+                    <a:prstClr val="black">
+                      <a:alpha val="40000"/>
+                    </a:prstClr>
+                  </a:outerShdw>
+                </a:effectLst>
+              </p:spPr>
+            </p:pic>
             <p:sp>
               <p:nvSpPr>
-                <p:cNvPr id="42" name="TextBox 41">
+                <p:cNvPr id="16" name="TextBox 15">
                   <a:extLst>
                     <a:ext uri="{FF2B5EF4-FFF2-40B4-BE49-F238E27FC236}">
-                      <a16:creationId xmlns:a16="http://schemas.microsoft.com/office/drawing/2014/main" id="{646D2A00-0C41-D885-A9D1-B06D8B217C68}"/>
+                      <a16:creationId xmlns:a16="http://schemas.microsoft.com/office/drawing/2014/main" id="{4F1AA1C2-2024-1CD2-7955-35E979A33537}"/>
                     </a:ext>
                   </a:extLst>
                 </p:cNvPr>
@@ -6617,8 +5939,8 @@
               </p:nvSpPr>
               <p:spPr>
                 <a:xfrm>
-                  <a:off x="3444323" y="2507616"/>
-                  <a:ext cx="3146978" cy="646331"/>
+                  <a:off x="3729800" y="4117305"/>
+                  <a:ext cx="4287992" cy="923330"/>
                 </a:xfrm>
                 <a:prstGeom prst="rect">
                   <a:avLst/>
@@ -6644,7 +5966,249 @@
                       <a:latin typeface="Dubai Light" panose="020B0303030403030204" pitchFamily="34" charset="-78"/>
                       <a:cs typeface="Dubai Light" panose="020B0303030403030204" pitchFamily="34" charset="-78"/>
                     </a:rPr>
-                    <a:t>Bergerak</a:t>
+                    <a:t>Objektif</a:t>
+                  </a:r>
+                  <a:r>
+                    <a:rPr lang="en-US" b="1" dirty="0">
+                      <a:solidFill>
+                        <a:schemeClr val="bg1"/>
+                      </a:solidFill>
+                      <a:latin typeface="Dubai Light" panose="020B0303030403030204" pitchFamily="34" charset="-78"/>
+                      <a:cs typeface="Dubai Light" panose="020B0303030403030204" pitchFamily="34" charset="-78"/>
+                    </a:rPr>
+                    <a:t>:</a:t>
+                  </a:r>
+                  <a:br>
+                    <a:rPr lang="en-US" b="1" dirty="0">
+                      <a:solidFill>
+                        <a:schemeClr val="bg1"/>
+                      </a:solidFill>
+                      <a:latin typeface="Dubai Light" panose="020B0303030403030204" pitchFamily="34" charset="-78"/>
+                      <a:cs typeface="Dubai Light" panose="020B0303030403030204" pitchFamily="34" charset="-78"/>
+                    </a:rPr>
+                  </a:br>
+                  <a:r>
+                    <a:rPr lang="en-US" dirty="0" err="1">
+                      <a:solidFill>
+                        <a:schemeClr val="bg1"/>
+                      </a:solidFill>
+                      <a:latin typeface="Dubai Light" panose="020B0303030403030204" pitchFamily="34" charset="-78"/>
+                      <a:cs typeface="Dubai Light" panose="020B0303030403030204" pitchFamily="34" charset="-78"/>
+                    </a:rPr>
+                    <a:t>Kumpulkan</a:t>
+                  </a:r>
+                  <a:r>
+                    <a:rPr lang="en-US" dirty="0">
+                      <a:solidFill>
+                        <a:schemeClr val="bg1"/>
+                      </a:solidFill>
+                      <a:latin typeface="Dubai Light" panose="020B0303030403030204" pitchFamily="34" charset="-78"/>
+                      <a:cs typeface="Dubai Light" panose="020B0303030403030204" pitchFamily="34" charset="-78"/>
+                    </a:rPr>
+                    <a:t> </a:t>
+                  </a:r>
+                  <a:r>
+                    <a:rPr lang="en-US" dirty="0" err="1">
+                      <a:solidFill>
+                        <a:schemeClr val="bg1"/>
+                      </a:solidFill>
+                      <a:latin typeface="Dubai Light" panose="020B0303030403030204" pitchFamily="34" charset="-78"/>
+                      <a:cs typeface="Dubai Light" panose="020B0303030403030204" pitchFamily="34" charset="-78"/>
+                    </a:rPr>
+                    <a:t>kotak</a:t>
+                  </a:r>
+                  <a:r>
+                    <a:rPr lang="en-US" dirty="0">
+                      <a:solidFill>
+                        <a:schemeClr val="bg1"/>
+                      </a:solidFill>
+                      <a:latin typeface="Dubai Light" panose="020B0303030403030204" pitchFamily="34" charset="-78"/>
+                      <a:cs typeface="Dubai Light" panose="020B0303030403030204" pitchFamily="34" charset="-78"/>
+                    </a:rPr>
+                    <a:t> </a:t>
+                  </a:r>
+                  <a:r>
+                    <a:rPr lang="en-US" dirty="0" err="1">
+                      <a:solidFill>
+                        <a:schemeClr val="bg1"/>
+                      </a:solidFill>
+                      <a:latin typeface="Dubai Light" panose="020B0303030403030204" pitchFamily="34" charset="-78"/>
+                      <a:cs typeface="Dubai Light" panose="020B0303030403030204" pitchFamily="34" charset="-78"/>
+                    </a:rPr>
+                    <a:t>berwarna</a:t>
+                  </a:r>
+                  <a:r>
+                    <a:rPr lang="en-US" dirty="0">
+                      <a:solidFill>
+                        <a:schemeClr val="bg1"/>
+                      </a:solidFill>
+                      <a:latin typeface="Dubai Light" panose="020B0303030403030204" pitchFamily="34" charset="-78"/>
+                      <a:cs typeface="Dubai Light" panose="020B0303030403030204" pitchFamily="34" charset="-78"/>
+                    </a:rPr>
+                    <a:t> </a:t>
+                  </a:r>
+                  <a:r>
+                    <a:rPr lang="en-US" dirty="0" err="1">
+                      <a:solidFill>
+                        <a:schemeClr val="bg1"/>
+                      </a:solidFill>
+                      <a:latin typeface="Dubai Light" panose="020B0303030403030204" pitchFamily="34" charset="-78"/>
+                      <a:cs typeface="Dubai Light" panose="020B0303030403030204" pitchFamily="34" charset="-78"/>
+                    </a:rPr>
+                    <a:t>merah</a:t>
+                  </a:r>
+                  <a:r>
+                    <a:rPr lang="en-US" dirty="0">
+                      <a:solidFill>
+                        <a:schemeClr val="bg1"/>
+                      </a:solidFill>
+                      <a:latin typeface="Dubai Light" panose="020B0303030403030204" pitchFamily="34" charset="-78"/>
+                      <a:cs typeface="Dubai Light" panose="020B0303030403030204" pitchFamily="34" charset="-78"/>
+                    </a:rPr>
+                    <a:t>.</a:t>
+                  </a:r>
+                  <a:br>
+                    <a:rPr lang="en-US" dirty="0">
+                      <a:solidFill>
+                        <a:schemeClr val="bg1"/>
+                      </a:solidFill>
+                      <a:latin typeface="Dubai Light" panose="020B0303030403030204" pitchFamily="34" charset="-78"/>
+                      <a:cs typeface="Dubai Light" panose="020B0303030403030204" pitchFamily="34" charset="-78"/>
+                    </a:rPr>
+                  </a:br>
+                  <a:r>
+                    <a:rPr lang="en-US" dirty="0" err="1">
+                      <a:solidFill>
+                        <a:schemeClr val="bg1"/>
+                      </a:solidFill>
+                      <a:latin typeface="Dubai Light" panose="020B0303030403030204" pitchFamily="34" charset="-78"/>
+                      <a:cs typeface="Dubai Light" panose="020B0303030403030204" pitchFamily="34" charset="-78"/>
+                    </a:rPr>
+                    <a:t>Kumpulkan</a:t>
+                  </a:r>
+                  <a:r>
+                    <a:rPr lang="en-US" dirty="0">
+                      <a:solidFill>
+                        <a:schemeClr val="bg1"/>
+                      </a:solidFill>
+                      <a:latin typeface="Dubai Light" panose="020B0303030403030204" pitchFamily="34" charset="-78"/>
+                      <a:cs typeface="Dubai Light" panose="020B0303030403030204" pitchFamily="34" charset="-78"/>
+                    </a:rPr>
+                    <a:t> sebelum </a:t>
+                  </a:r>
+                  <a:r>
+                    <a:rPr lang="en-US" dirty="0" err="1">
+                      <a:solidFill>
+                        <a:schemeClr val="bg1"/>
+                      </a:solidFill>
+                      <a:latin typeface="Dubai Light" panose="020B0303030403030204" pitchFamily="34" charset="-78"/>
+                      <a:cs typeface="Dubai Light" panose="020B0303030403030204" pitchFamily="34" charset="-78"/>
+                    </a:rPr>
+                    <a:t>waktu</a:t>
+                  </a:r>
+                  <a:r>
+                    <a:rPr lang="en-US" dirty="0">
+                      <a:solidFill>
+                        <a:schemeClr val="bg1"/>
+                      </a:solidFill>
+                      <a:latin typeface="Dubai Light" panose="020B0303030403030204" pitchFamily="34" charset="-78"/>
+                      <a:cs typeface="Dubai Light" panose="020B0303030403030204" pitchFamily="34" charset="-78"/>
+                    </a:rPr>
+                    <a:t> </a:t>
+                  </a:r>
+                  <a:r>
+                    <a:rPr lang="en-US" dirty="0" err="1">
+                      <a:solidFill>
+                        <a:schemeClr val="bg1"/>
+                      </a:solidFill>
+                      <a:latin typeface="Dubai Light" panose="020B0303030403030204" pitchFamily="34" charset="-78"/>
+                      <a:cs typeface="Dubai Light" panose="020B0303030403030204" pitchFamily="34" charset="-78"/>
+                    </a:rPr>
+                    <a:t>habis</a:t>
+                  </a:r>
+                  <a:r>
+                    <a:rPr lang="en-US" dirty="0">
+                      <a:solidFill>
+                        <a:schemeClr val="bg1"/>
+                      </a:solidFill>
+                      <a:latin typeface="Dubai Light" panose="020B0303030403030204" pitchFamily="34" charset="-78"/>
+                      <a:cs typeface="Dubai Light" panose="020B0303030403030204" pitchFamily="34" charset="-78"/>
+                    </a:rPr>
+                    <a:t>.</a:t>
+                  </a:r>
+                  <a:endParaRPr lang="id-ID" dirty="0">
+                    <a:solidFill>
+                      <a:schemeClr val="bg1"/>
+                    </a:solidFill>
+                    <a:latin typeface="Dubai Light" panose="020B0303030403030204" pitchFamily="34" charset="-78"/>
+                    <a:cs typeface="Dubai Light" panose="020B0303030403030204" pitchFamily="34" charset="-78"/>
+                  </a:endParaRPr>
+                </a:p>
+              </p:txBody>
+            </p:sp>
+          </p:grpSp>
+          <p:grpSp>
+            <p:nvGrpSpPr>
+              <p:cNvPr id="49" name="Group 48">
+                <a:extLst>
+                  <a:ext uri="{FF2B5EF4-FFF2-40B4-BE49-F238E27FC236}">
+                    <a16:creationId xmlns:a16="http://schemas.microsoft.com/office/drawing/2014/main" id="{758B6F2B-5447-62D5-D6DB-CB0D259719EB}"/>
+                  </a:ext>
+                </a:extLst>
+              </p:cNvPr>
+              <p:cNvGrpSpPr/>
+              <p:nvPr/>
+            </p:nvGrpSpPr>
+            <p:grpSpPr>
+              <a:xfrm>
+                <a:off x="1087402" y="4114128"/>
+                <a:ext cx="5758487" cy="671731"/>
+                <a:chOff x="1173188" y="3421861"/>
+                <a:chExt cx="5758487" cy="671731"/>
+              </a:xfrm>
+            </p:grpSpPr>
+            <p:sp>
+              <p:nvSpPr>
+                <p:cNvPr id="43" name="TextBox 42">
+                  <a:extLst>
+                    <a:ext uri="{FF2B5EF4-FFF2-40B4-BE49-F238E27FC236}">
+                      <a16:creationId xmlns:a16="http://schemas.microsoft.com/office/drawing/2014/main" id="{7F4AD9AA-DBC3-5625-3F3E-F20857AF73D9}"/>
+                    </a:ext>
+                  </a:extLst>
+                </p:cNvPr>
+                <p:cNvSpPr txBox="1"/>
+                <p:nvPr/>
+              </p:nvSpPr>
+              <p:spPr>
+                <a:xfrm>
+                  <a:off x="3444322" y="3447261"/>
+                  <a:ext cx="3487353" cy="646331"/>
+                </a:xfrm>
+                <a:prstGeom prst="rect">
+                  <a:avLst/>
+                </a:prstGeom>
+                <a:noFill/>
+              </p:spPr>
+              <p:txBody>
+                <a:bodyPr wrap="square" rtlCol="0">
+                  <a:spAutoFit/>
+                </a:bodyPr>
+                <a:lstStyle/>
+                <a:p>
+                  <a:pPr>
+                    <a:spcAft>
+                      <a:spcPts val="1200"/>
+                    </a:spcAft>
+                  </a:pPr>
+                  <a:r>
+                    <a:rPr lang="en-US" b="1" dirty="0" err="1">
+                      <a:solidFill>
+                        <a:schemeClr val="bg1"/>
+                      </a:solidFill>
+                      <a:latin typeface="Dubai Light" panose="020B0303030403030204" pitchFamily="34" charset="-78"/>
+                      <a:cs typeface="Dubai Light" panose="020B0303030403030204" pitchFamily="34" charset="-78"/>
+                    </a:rPr>
+                    <a:t>Melompat</a:t>
                   </a:r>
                   <a:r>
                     <a:rPr lang="en-US" b="1" dirty="0">
@@ -6693,7 +6257,7 @@
                       <a:latin typeface="Dubai Light" panose="020B0303030403030204" pitchFamily="34" charset="-78"/>
                       <a:cs typeface="Dubai Light" panose="020B0303030403030204" pitchFamily="34" charset="-78"/>
                     </a:rPr>
-                    <a:t>WASD</a:t>
+                    <a:t>Spacebar</a:t>
                   </a:r>
                   <a:r>
                     <a:rPr lang="en-US" dirty="0">
@@ -6713,7 +6277,7 @@
                       <a:latin typeface="Dubai Light" panose="020B0303030403030204" pitchFamily="34" charset="-78"/>
                       <a:cs typeface="Dubai Light" panose="020B0303030403030204" pitchFamily="34" charset="-78"/>
                     </a:rPr>
-                    <a:t>bergerak</a:t>
+                    <a:t>melompat</a:t>
                   </a:r>
                   <a:r>
                     <a:rPr lang="en-US" dirty="0">
@@ -6737,10 +6301,10 @@
             </p:sp>
             <p:pic>
               <p:nvPicPr>
-                <p:cNvPr id="45" name="Picture 44">
+                <p:cNvPr id="47" name="Picture 46">
                   <a:extLst>
                     <a:ext uri="{FF2B5EF4-FFF2-40B4-BE49-F238E27FC236}">
-                      <a16:creationId xmlns:a16="http://schemas.microsoft.com/office/drawing/2014/main" id="{1FC40406-1CB0-E494-8272-2C8B293E5E34}"/>
+                      <a16:creationId xmlns:a16="http://schemas.microsoft.com/office/drawing/2014/main" id="{DC88A2BA-BA38-A50A-5426-5A0A2A165C70}"/>
                     </a:ext>
                   </a:extLst>
                 </p:cNvPr>
@@ -6750,7 +6314,7 @@
                 <p:nvPr/>
               </p:nvPicPr>
               <p:blipFill>
-                <a:blip r:embed="rId5">
+                <a:blip r:embed="rId3">
                   <a:extLst>
                     <a:ext uri="{28A0092B-C50C-407E-A947-70E740481C1C}">
                       <a14:useLocalDpi xmlns:a14="http://schemas.microsoft.com/office/drawing/2010/main" val="0"/>
@@ -6763,8 +6327,8 @@
               </p:blipFill>
               <p:spPr>
                 <a:xfrm>
-                  <a:off x="1191045" y="1740606"/>
-                  <a:ext cx="2235420" cy="1366090"/>
+                  <a:off x="1173188" y="3421861"/>
+                  <a:ext cx="2271134" cy="646331"/>
                 </a:xfrm>
                 <a:prstGeom prst="rect">
                   <a:avLst/>
@@ -6774,10 +6338,10 @@
           </p:grpSp>
           <p:grpSp>
             <p:nvGrpSpPr>
-              <p:cNvPr id="79" name="Group 78">
+              <p:cNvPr id="57" name="Group 56">
                 <a:extLst>
                   <a:ext uri="{FF2B5EF4-FFF2-40B4-BE49-F238E27FC236}">
-                    <a16:creationId xmlns:a16="http://schemas.microsoft.com/office/drawing/2014/main" id="{17762CAA-5494-AFB8-0C24-EFF6EDB4F086}"/>
+                    <a16:creationId xmlns:a16="http://schemas.microsoft.com/office/drawing/2014/main" id="{DB848B1A-6F03-C22B-2611-1F1AC4310916}"/>
                   </a:ext>
                 </a:extLst>
               </p:cNvPr>
@@ -6786,18 +6350,54 @@
             </p:nvGrpSpPr>
             <p:grpSpPr>
               <a:xfrm>
-                <a:off x="870511" y="1191389"/>
-                <a:ext cx="2857252" cy="1887796"/>
-                <a:chOff x="870511" y="1191389"/>
-                <a:chExt cx="2857252" cy="1887796"/>
+                <a:off x="1087402" y="3368228"/>
+                <a:ext cx="4892662" cy="672566"/>
+                <a:chOff x="1173188" y="3840438"/>
+                <a:chExt cx="4892662" cy="672566"/>
               </a:xfrm>
             </p:grpSpPr>
+            <p:pic>
+              <p:nvPicPr>
+                <p:cNvPr id="54" name="Picture 53">
+                  <a:extLst>
+                    <a:ext uri="{FF2B5EF4-FFF2-40B4-BE49-F238E27FC236}">
+                      <a16:creationId xmlns:a16="http://schemas.microsoft.com/office/drawing/2014/main" id="{DD4FAE06-D817-0FE5-A124-A38A1F727C62}"/>
+                    </a:ext>
+                  </a:extLst>
+                </p:cNvPr>
+                <p:cNvPicPr>
+                  <a:picLocks noChangeAspect="1"/>
+                </p:cNvPicPr>
+                <p:nvPr/>
+              </p:nvPicPr>
+              <p:blipFill>
+                <a:blip r:embed="rId4">
+                  <a:extLst>
+                    <a:ext uri="{28A0092B-C50C-407E-A947-70E740481C1C}">
+                      <a14:useLocalDpi xmlns:a14="http://schemas.microsoft.com/office/drawing/2010/main" val="0"/>
+                    </a:ext>
+                  </a:extLst>
+                </a:blip>
+                <a:stretch>
+                  <a:fillRect/>
+                </a:stretch>
+              </p:blipFill>
+              <p:spPr>
+                <a:xfrm>
+                  <a:off x="1173188" y="3840438"/>
+                  <a:ext cx="2276999" cy="648000"/>
+                </a:xfrm>
+                <a:prstGeom prst="rect">
+                  <a:avLst/>
+                </a:prstGeom>
+              </p:spPr>
+            </p:pic>
             <p:sp>
               <p:nvSpPr>
-                <p:cNvPr id="73" name="TextBox 72">
+                <p:cNvPr id="56" name="TextBox 55">
                   <a:extLst>
                     <a:ext uri="{FF2B5EF4-FFF2-40B4-BE49-F238E27FC236}">
-                      <a16:creationId xmlns:a16="http://schemas.microsoft.com/office/drawing/2014/main" id="{0B2EB2F9-D200-64B8-D50A-2E10DED2AC5C}"/>
+                      <a16:creationId xmlns:a16="http://schemas.microsoft.com/office/drawing/2014/main" id="{73A79892-97AC-0265-4DB7-027D220934F4}"/>
                     </a:ext>
                   </a:extLst>
                 </p:cNvPr>
@@ -6806,57 +6406,8 @@
               </p:nvSpPr>
               <p:spPr>
                 <a:xfrm>
-                  <a:off x="870511" y="1938558"/>
-                  <a:ext cx="1286331" cy="307777"/>
-                </a:xfrm>
-                <a:prstGeom prst="rect">
-                  <a:avLst/>
-                </a:prstGeom>
-                <a:noFill/>
-              </p:spPr>
-              <p:txBody>
-                <a:bodyPr wrap="square" rtlCol="0">
-                  <a:spAutoFit/>
-                </a:bodyPr>
-                <a:lstStyle>
-                  <a:defPPr>
-                    <a:defRPr lang="id-ID"/>
-                  </a:defPPr>
-                  <a:lvl1pPr algn="ctr">
-                    <a:defRPr sz="1400">
-                      <a:solidFill>
-                        <a:schemeClr val="bg1"/>
-                      </a:solidFill>
-                      <a:latin typeface="Dubai Light" panose="020B0303030403030204" pitchFamily="34" charset="-78"/>
-                      <a:cs typeface="Dubai Light" panose="020B0303030403030204" pitchFamily="34" charset="-78"/>
-                    </a:defRPr>
-                  </a:lvl1pPr>
-                </a:lstStyle>
-                <a:p>
-                  <a:r>
-                    <a:rPr lang="en-US" dirty="0"/>
-                    <a:t>Kiri</a:t>
-                  </a:r>
-                  <a:endParaRPr lang="id-ID" dirty="0"/>
-                </a:p>
-              </p:txBody>
-            </p:sp>
-            <p:sp>
-              <p:nvSpPr>
-                <p:cNvPr id="76" name="TextBox 75">
-                  <a:extLst>
-                    <a:ext uri="{FF2B5EF4-FFF2-40B4-BE49-F238E27FC236}">
-                      <a16:creationId xmlns:a16="http://schemas.microsoft.com/office/drawing/2014/main" id="{579FA3CD-17A0-40F9-A095-F76B5C7EFD81}"/>
-                    </a:ext>
-                  </a:extLst>
-                </p:cNvPr>
-                <p:cNvSpPr txBox="1"/>
-                <p:nvPr/>
-              </p:nvSpPr>
-              <p:spPr>
-                <a:xfrm>
-                  <a:off x="1658599" y="1191389"/>
-                  <a:ext cx="1286331" cy="307777"/>
+                  <a:off x="3444322" y="3866673"/>
+                  <a:ext cx="2621528" cy="646331"/>
                 </a:xfrm>
                 <a:prstGeom prst="rect">
                   <a:avLst/>
@@ -6869,18 +6420,101 @@
                 </a:bodyPr>
                 <a:lstStyle/>
                 <a:p>
-                  <a:pPr algn="ctr"/>
+                  <a:pPr>
+                    <a:spcAft>
+                      <a:spcPts val="1200"/>
+                    </a:spcAft>
+                  </a:pPr>
                   <a:r>
-                    <a:rPr lang="en-US" sz="1400" dirty="0" err="1">
+                    <a:rPr lang="en-US" b="1" dirty="0" err="1">
                       <a:solidFill>
                         <a:schemeClr val="bg1"/>
                       </a:solidFill>
                       <a:latin typeface="Dubai Light" panose="020B0303030403030204" pitchFamily="34" charset="-78"/>
                       <a:cs typeface="Dubai Light" panose="020B0303030403030204" pitchFamily="34" charset="-78"/>
                     </a:rPr>
-                    <a:t>Maju</a:t>
+                    <a:t>Berlari</a:t>
                   </a:r>
-                  <a:endParaRPr lang="id-ID" sz="1400" dirty="0">
+                  <a:r>
+                    <a:rPr lang="en-US" b="1" dirty="0">
+                      <a:solidFill>
+                        <a:schemeClr val="bg1"/>
+                      </a:solidFill>
+                      <a:latin typeface="Dubai Light" panose="020B0303030403030204" pitchFamily="34" charset="-78"/>
+                      <a:cs typeface="Dubai Light" panose="020B0303030403030204" pitchFamily="34" charset="-78"/>
+                    </a:rPr>
+                    <a:t>:</a:t>
+                  </a:r>
+                  <a:br>
+                    <a:rPr lang="en-US" b="1" dirty="0">
+                      <a:solidFill>
+                        <a:schemeClr val="bg1"/>
+                      </a:solidFill>
+                      <a:latin typeface="Dubai Light" panose="020B0303030403030204" pitchFamily="34" charset="-78"/>
+                      <a:cs typeface="Dubai Light" panose="020B0303030403030204" pitchFamily="34" charset="-78"/>
+                    </a:rPr>
+                  </a:br>
+                  <a:r>
+                    <a:rPr lang="en-US" dirty="0" err="1">
+                      <a:solidFill>
+                        <a:schemeClr val="bg1"/>
+                      </a:solidFill>
+                      <a:latin typeface="Dubai Light" panose="020B0303030403030204" pitchFamily="34" charset="-78"/>
+                      <a:cs typeface="Dubai Light" panose="020B0303030403030204" pitchFamily="34" charset="-78"/>
+                    </a:rPr>
+                    <a:t>Tekan</a:t>
+                  </a:r>
+                  <a:r>
+                    <a:rPr lang="en-US" dirty="0">
+                      <a:solidFill>
+                        <a:schemeClr val="bg1"/>
+                      </a:solidFill>
+                      <a:latin typeface="Dubai Light" panose="020B0303030403030204" pitchFamily="34" charset="-78"/>
+                      <a:cs typeface="Dubai Light" panose="020B0303030403030204" pitchFamily="34" charset="-78"/>
+                    </a:rPr>
+                    <a:t> </a:t>
+                  </a:r>
+                  <a:r>
+                    <a:rPr lang="en-US" b="1" dirty="0">
+                      <a:solidFill>
+                        <a:schemeClr val="bg1"/>
+                      </a:solidFill>
+                      <a:latin typeface="Dubai Light" panose="020B0303030403030204" pitchFamily="34" charset="-78"/>
+                      <a:cs typeface="Dubai Light" panose="020B0303030403030204" pitchFamily="34" charset="-78"/>
+                    </a:rPr>
+                    <a:t>Shift</a:t>
+                  </a:r>
+                  <a:r>
+                    <a:rPr lang="en-US" dirty="0">
+                      <a:solidFill>
+                        <a:schemeClr val="bg1"/>
+                      </a:solidFill>
+                      <a:latin typeface="Dubai Light" panose="020B0303030403030204" pitchFamily="34" charset="-78"/>
+                      <a:cs typeface="Dubai Light" panose="020B0303030403030204" pitchFamily="34" charset="-78"/>
+                    </a:rPr>
+                    <a:t> untuk </a:t>
+                  </a:r>
+                  <a:r>
+                    <a:rPr lang="en-US" dirty="0" err="1">
+                      <a:solidFill>
+                        <a:schemeClr val="bg1"/>
+                      </a:solidFill>
+                      <a:latin typeface="Dubai Light" panose="020B0303030403030204" pitchFamily="34" charset="-78"/>
+                      <a:cs typeface="Dubai Light" panose="020B0303030403030204" pitchFamily="34" charset="-78"/>
+                    </a:rPr>
+                    <a:t>berlari</a:t>
+                  </a:r>
+                  <a:r>
+                    <a:rPr lang="en-US" dirty="0">
+                      <a:solidFill>
+                        <a:schemeClr val="bg1"/>
+                      </a:solidFill>
+                      <a:latin typeface="Dubai Light" panose="020B0303030403030204" pitchFamily="34" charset="-78"/>
+                      <a:cs typeface="Dubai Light" panose="020B0303030403030204" pitchFamily="34" charset="-78"/>
+                    </a:rPr>
+                    <a:t>.</a:t>
+                  </a:r>
+                  <a:endParaRPr lang="id-ID" dirty="0">
                     <a:solidFill>
                       <a:schemeClr val="bg1"/>
                     </a:solidFill>
@@ -6890,12 +6524,460 @@
                 </a:p>
               </p:txBody>
             </p:sp>
+          </p:grpSp>
+          <p:grpSp>
+            <p:nvGrpSpPr>
+              <p:cNvPr id="80" name="Group 79">
+                <a:extLst>
+                  <a:ext uri="{FF2B5EF4-FFF2-40B4-BE49-F238E27FC236}">
+                    <a16:creationId xmlns:a16="http://schemas.microsoft.com/office/drawing/2014/main" id="{D5A36018-8BDD-BD95-366B-4F8459B67EE1}"/>
+                  </a:ext>
+                </a:extLst>
+              </p:cNvPr>
+              <p:cNvGrpSpPr/>
+              <p:nvPr/>
+            </p:nvGrpSpPr>
+            <p:grpSpPr>
+              <a:xfrm>
+                <a:off x="784725" y="1356489"/>
+                <a:ext cx="5720790" cy="1887796"/>
+                <a:chOff x="870511" y="1191389"/>
+                <a:chExt cx="5720790" cy="1887796"/>
+              </a:xfrm>
+            </p:grpSpPr>
+            <p:grpSp>
+              <p:nvGrpSpPr>
+                <p:cNvPr id="50" name="Group 49">
+                  <a:extLst>
+                    <a:ext uri="{FF2B5EF4-FFF2-40B4-BE49-F238E27FC236}">
+                      <a16:creationId xmlns:a16="http://schemas.microsoft.com/office/drawing/2014/main" id="{86EA0678-141B-3D4D-5EBB-E2FCC4EE3855}"/>
+                    </a:ext>
+                  </a:extLst>
+                </p:cNvPr>
+                <p:cNvGrpSpPr/>
+                <p:nvPr/>
+              </p:nvGrpSpPr>
+              <p:grpSpPr>
+                <a:xfrm>
+                  <a:off x="1191045" y="1432176"/>
+                  <a:ext cx="5400256" cy="1413341"/>
+                  <a:chOff x="1191045" y="1740606"/>
+                  <a:chExt cx="5400256" cy="1413341"/>
+                </a:xfrm>
+              </p:grpSpPr>
+              <p:sp>
+                <p:nvSpPr>
+                  <p:cNvPr id="42" name="TextBox 41">
+                    <a:extLst>
+                      <a:ext uri="{FF2B5EF4-FFF2-40B4-BE49-F238E27FC236}">
+                        <a16:creationId xmlns:a16="http://schemas.microsoft.com/office/drawing/2014/main" id="{646D2A00-0C41-D885-A9D1-B06D8B217C68}"/>
+                      </a:ext>
+                    </a:extLst>
+                  </p:cNvPr>
+                  <p:cNvSpPr txBox="1"/>
+                  <p:nvPr/>
+                </p:nvSpPr>
+                <p:spPr>
+                  <a:xfrm>
+                    <a:off x="3444323" y="2507616"/>
+                    <a:ext cx="3146978" cy="646331"/>
+                  </a:xfrm>
+                  <a:prstGeom prst="rect">
+                    <a:avLst/>
+                  </a:prstGeom>
+                  <a:noFill/>
+                </p:spPr>
+                <p:txBody>
+                  <a:bodyPr wrap="square" rtlCol="0">
+                    <a:spAutoFit/>
+                  </a:bodyPr>
+                  <a:lstStyle/>
+                  <a:p>
+                    <a:pPr>
+                      <a:spcAft>
+                        <a:spcPts val="1200"/>
+                      </a:spcAft>
+                    </a:pPr>
+                    <a:r>
+                      <a:rPr lang="en-US" b="1" dirty="0" err="1">
+                        <a:solidFill>
+                          <a:schemeClr val="bg1"/>
+                        </a:solidFill>
+                        <a:latin typeface="Dubai Light" panose="020B0303030403030204" pitchFamily="34" charset="-78"/>
+                        <a:cs typeface="Dubai Light" panose="020B0303030403030204" pitchFamily="34" charset="-78"/>
+                      </a:rPr>
+                      <a:t>Bergerak</a:t>
+                    </a:r>
+                    <a:r>
+                      <a:rPr lang="en-US" b="1" dirty="0">
+                        <a:solidFill>
+                          <a:schemeClr val="bg1"/>
+                        </a:solidFill>
+                        <a:latin typeface="Dubai Light" panose="020B0303030403030204" pitchFamily="34" charset="-78"/>
+                        <a:cs typeface="Dubai Light" panose="020B0303030403030204" pitchFamily="34" charset="-78"/>
+                      </a:rPr>
+                      <a:t>:</a:t>
+                    </a:r>
+                    <a:br>
+                      <a:rPr lang="en-US" b="1" dirty="0">
+                        <a:solidFill>
+                          <a:schemeClr val="bg1"/>
+                        </a:solidFill>
+                        <a:latin typeface="Dubai Light" panose="020B0303030403030204" pitchFamily="34" charset="-78"/>
+                        <a:cs typeface="Dubai Light" panose="020B0303030403030204" pitchFamily="34" charset="-78"/>
+                      </a:rPr>
+                    </a:br>
+                    <a:r>
+                      <a:rPr lang="en-US" dirty="0" err="1">
+                        <a:solidFill>
+                          <a:schemeClr val="bg1"/>
+                        </a:solidFill>
+                        <a:latin typeface="Dubai Light" panose="020B0303030403030204" pitchFamily="34" charset="-78"/>
+                        <a:cs typeface="Dubai Light" panose="020B0303030403030204" pitchFamily="34" charset="-78"/>
+                      </a:rPr>
+                      <a:t>Gunakan</a:t>
+                    </a:r>
+                    <a:r>
+                      <a:rPr lang="en-US" dirty="0">
+                        <a:solidFill>
+                          <a:schemeClr val="bg1"/>
+                        </a:solidFill>
+                        <a:latin typeface="Dubai Light" panose="020B0303030403030204" pitchFamily="34" charset="-78"/>
+                        <a:cs typeface="Dubai Light" panose="020B0303030403030204" pitchFamily="34" charset="-78"/>
+                      </a:rPr>
+                      <a:t> </a:t>
+                    </a:r>
+                    <a:r>
+                      <a:rPr lang="en-US" b="1" dirty="0">
+                        <a:solidFill>
+                          <a:schemeClr val="bg1"/>
+                        </a:solidFill>
+                        <a:latin typeface="Dubai Light" panose="020B0303030403030204" pitchFamily="34" charset="-78"/>
+                        <a:cs typeface="Dubai Light" panose="020B0303030403030204" pitchFamily="34" charset="-78"/>
+                      </a:rPr>
+                      <a:t>WASD</a:t>
+                    </a:r>
+                    <a:r>
+                      <a:rPr lang="en-US" dirty="0">
+                        <a:solidFill>
+                          <a:schemeClr val="bg1"/>
+                        </a:solidFill>
+                        <a:latin typeface="Dubai Light" panose="020B0303030403030204" pitchFamily="34" charset="-78"/>
+                        <a:cs typeface="Dubai Light" panose="020B0303030403030204" pitchFamily="34" charset="-78"/>
+                      </a:rPr>
+                      <a:t> untuk </a:t>
+                    </a:r>
+                    <a:r>
+                      <a:rPr lang="en-US" dirty="0" err="1">
+                        <a:solidFill>
+                          <a:schemeClr val="bg1"/>
+                        </a:solidFill>
+                        <a:latin typeface="Dubai Light" panose="020B0303030403030204" pitchFamily="34" charset="-78"/>
+                        <a:cs typeface="Dubai Light" panose="020B0303030403030204" pitchFamily="34" charset="-78"/>
+                      </a:rPr>
+                      <a:t>bergerak</a:t>
+                    </a:r>
+                    <a:r>
+                      <a:rPr lang="en-US" dirty="0">
+                        <a:solidFill>
+                          <a:schemeClr val="bg1"/>
+                        </a:solidFill>
+                        <a:latin typeface="Dubai Light" panose="020B0303030403030204" pitchFamily="34" charset="-78"/>
+                        <a:cs typeface="Dubai Light" panose="020B0303030403030204" pitchFamily="34" charset="-78"/>
+                      </a:rPr>
+                      <a:t>.</a:t>
+                    </a:r>
+                    <a:endParaRPr lang="id-ID" dirty="0">
+                      <a:solidFill>
+                        <a:schemeClr val="bg1"/>
+                      </a:solidFill>
+                      <a:latin typeface="Dubai Light" panose="020B0303030403030204" pitchFamily="34" charset="-78"/>
+                      <a:cs typeface="Dubai Light" panose="020B0303030403030204" pitchFamily="34" charset="-78"/>
+                    </a:endParaRPr>
+                  </a:p>
+                </p:txBody>
+              </p:sp>
+              <p:pic>
+                <p:nvPicPr>
+                  <p:cNvPr id="45" name="Picture 44">
+                    <a:extLst>
+                      <a:ext uri="{FF2B5EF4-FFF2-40B4-BE49-F238E27FC236}">
+                        <a16:creationId xmlns:a16="http://schemas.microsoft.com/office/drawing/2014/main" id="{1FC40406-1CB0-E494-8272-2C8B293E5E34}"/>
+                      </a:ext>
+                    </a:extLst>
+                  </p:cNvPr>
+                  <p:cNvPicPr>
+                    <a:picLocks noChangeAspect="1"/>
+                  </p:cNvPicPr>
+                  <p:nvPr/>
+                </p:nvPicPr>
+                <p:blipFill>
+                  <a:blip r:embed="rId5">
+                    <a:extLst>
+                      <a:ext uri="{28A0092B-C50C-407E-A947-70E740481C1C}">
+                        <a14:useLocalDpi xmlns:a14="http://schemas.microsoft.com/office/drawing/2010/main" val="0"/>
+                      </a:ext>
+                    </a:extLst>
+                  </a:blip>
+                  <a:stretch>
+                    <a:fillRect/>
+                  </a:stretch>
+                </p:blipFill>
+                <p:spPr>
+                  <a:xfrm>
+                    <a:off x="1191045" y="1740606"/>
+                    <a:ext cx="2235420" cy="1366090"/>
+                  </a:xfrm>
+                  <a:prstGeom prst="rect">
+                    <a:avLst/>
+                  </a:prstGeom>
+                </p:spPr>
+              </p:pic>
+            </p:grpSp>
+            <p:grpSp>
+              <p:nvGrpSpPr>
+                <p:cNvPr id="79" name="Group 78">
+                  <a:extLst>
+                    <a:ext uri="{FF2B5EF4-FFF2-40B4-BE49-F238E27FC236}">
+                      <a16:creationId xmlns:a16="http://schemas.microsoft.com/office/drawing/2014/main" id="{17762CAA-5494-AFB8-0C24-EFF6EDB4F086}"/>
+                    </a:ext>
+                  </a:extLst>
+                </p:cNvPr>
+                <p:cNvGrpSpPr/>
+                <p:nvPr/>
+              </p:nvGrpSpPr>
+              <p:grpSpPr>
+                <a:xfrm>
+                  <a:off x="870511" y="1191389"/>
+                  <a:ext cx="2857252" cy="1887796"/>
+                  <a:chOff x="870511" y="1191389"/>
+                  <a:chExt cx="2857252" cy="1887796"/>
+                </a:xfrm>
+              </p:grpSpPr>
+              <p:sp>
+                <p:nvSpPr>
+                  <p:cNvPr id="73" name="TextBox 72">
+                    <a:extLst>
+                      <a:ext uri="{FF2B5EF4-FFF2-40B4-BE49-F238E27FC236}">
+                        <a16:creationId xmlns:a16="http://schemas.microsoft.com/office/drawing/2014/main" id="{0B2EB2F9-D200-64B8-D50A-2E10DED2AC5C}"/>
+                      </a:ext>
+                    </a:extLst>
+                  </p:cNvPr>
+                  <p:cNvSpPr txBox="1"/>
+                  <p:nvPr/>
+                </p:nvSpPr>
+                <p:spPr>
+                  <a:xfrm>
+                    <a:off x="870511" y="1938558"/>
+                    <a:ext cx="1286331" cy="307777"/>
+                  </a:xfrm>
+                  <a:prstGeom prst="rect">
+                    <a:avLst/>
+                  </a:prstGeom>
+                  <a:noFill/>
+                </p:spPr>
+                <p:txBody>
+                  <a:bodyPr wrap="square" rtlCol="0">
+                    <a:spAutoFit/>
+                  </a:bodyPr>
+                  <a:lstStyle>
+                    <a:defPPr>
+                      <a:defRPr lang="id-ID"/>
+                    </a:defPPr>
+                    <a:lvl1pPr algn="ctr">
+                      <a:defRPr sz="1400">
+                        <a:solidFill>
+                          <a:schemeClr val="bg1"/>
+                        </a:solidFill>
+                        <a:latin typeface="Dubai Light" panose="020B0303030403030204" pitchFamily="34" charset="-78"/>
+                        <a:cs typeface="Dubai Light" panose="020B0303030403030204" pitchFamily="34" charset="-78"/>
+                      </a:defRPr>
+                    </a:lvl1pPr>
+                  </a:lstStyle>
+                  <a:p>
+                    <a:r>
+                      <a:rPr lang="en-US" dirty="0"/>
+                      <a:t>Kiri</a:t>
+                    </a:r>
+                    <a:endParaRPr lang="id-ID" dirty="0"/>
+                  </a:p>
+                </p:txBody>
+              </p:sp>
+              <p:sp>
+                <p:nvSpPr>
+                  <p:cNvPr id="76" name="TextBox 75">
+                    <a:extLst>
+                      <a:ext uri="{FF2B5EF4-FFF2-40B4-BE49-F238E27FC236}">
+                        <a16:creationId xmlns:a16="http://schemas.microsoft.com/office/drawing/2014/main" id="{579FA3CD-17A0-40F9-A095-F76B5C7EFD81}"/>
+                      </a:ext>
+                    </a:extLst>
+                  </p:cNvPr>
+                  <p:cNvSpPr txBox="1"/>
+                  <p:nvPr/>
+                </p:nvSpPr>
+                <p:spPr>
+                  <a:xfrm>
+                    <a:off x="1658599" y="1191389"/>
+                    <a:ext cx="1286331" cy="307777"/>
+                  </a:xfrm>
+                  <a:prstGeom prst="rect">
+                    <a:avLst/>
+                  </a:prstGeom>
+                  <a:noFill/>
+                </p:spPr>
+                <p:txBody>
+                  <a:bodyPr wrap="square" rtlCol="0">
+                    <a:spAutoFit/>
+                  </a:bodyPr>
+                  <a:lstStyle/>
+                  <a:p>
+                    <a:pPr algn="ctr"/>
+                    <a:r>
+                      <a:rPr lang="en-US" sz="1400" dirty="0" err="1">
+                        <a:solidFill>
+                          <a:schemeClr val="bg1"/>
+                        </a:solidFill>
+                        <a:latin typeface="Dubai Light" panose="020B0303030403030204" pitchFamily="34" charset="-78"/>
+                        <a:cs typeface="Dubai Light" panose="020B0303030403030204" pitchFamily="34" charset="-78"/>
+                      </a:rPr>
+                      <a:t>Maju</a:t>
+                    </a:r>
+                    <a:endParaRPr lang="id-ID" sz="1400" dirty="0">
+                      <a:solidFill>
+                        <a:schemeClr val="bg1"/>
+                      </a:solidFill>
+                      <a:latin typeface="Dubai Light" panose="020B0303030403030204" pitchFamily="34" charset="-78"/>
+                      <a:cs typeface="Dubai Light" panose="020B0303030403030204" pitchFamily="34" charset="-78"/>
+                    </a:endParaRPr>
+                  </a:p>
+                </p:txBody>
+              </p:sp>
+              <p:sp>
+                <p:nvSpPr>
+                  <p:cNvPr id="77" name="TextBox 76">
+                    <a:extLst>
+                      <a:ext uri="{FF2B5EF4-FFF2-40B4-BE49-F238E27FC236}">
+                        <a16:creationId xmlns:a16="http://schemas.microsoft.com/office/drawing/2014/main" id="{4D1C48E8-C921-720E-F501-0B7CAC245B52}"/>
+                      </a:ext>
+                    </a:extLst>
+                  </p:cNvPr>
+                  <p:cNvSpPr txBox="1"/>
+                  <p:nvPr/>
+                </p:nvSpPr>
+                <p:spPr>
+                  <a:xfrm>
+                    <a:off x="2441432" y="1938558"/>
+                    <a:ext cx="1286331" cy="307777"/>
+                  </a:xfrm>
+                  <a:prstGeom prst="rect">
+                    <a:avLst/>
+                  </a:prstGeom>
+                  <a:noFill/>
+                </p:spPr>
+                <p:txBody>
+                  <a:bodyPr wrap="square" rtlCol="0">
+                    <a:spAutoFit/>
+                  </a:bodyPr>
+                  <a:lstStyle/>
+                  <a:p>
+                    <a:pPr algn="ctr"/>
+                    <a:r>
+                      <a:rPr lang="en-US" sz="1400" dirty="0">
+                        <a:solidFill>
+                          <a:schemeClr val="bg1"/>
+                        </a:solidFill>
+                        <a:latin typeface="Dubai Light" panose="020B0303030403030204" pitchFamily="34" charset="-78"/>
+                        <a:cs typeface="Dubai Light" panose="020B0303030403030204" pitchFamily="34" charset="-78"/>
+                      </a:rPr>
+                      <a:t>Kanan</a:t>
+                    </a:r>
+                    <a:endParaRPr lang="id-ID" sz="1400" dirty="0">
+                      <a:solidFill>
+                        <a:schemeClr val="bg1"/>
+                      </a:solidFill>
+                      <a:latin typeface="Dubai Light" panose="020B0303030403030204" pitchFamily="34" charset="-78"/>
+                      <a:cs typeface="Dubai Light" panose="020B0303030403030204" pitchFamily="34" charset="-78"/>
+                    </a:endParaRPr>
+                  </a:p>
+                </p:txBody>
+              </p:sp>
+              <p:sp>
+                <p:nvSpPr>
+                  <p:cNvPr id="78" name="TextBox 77">
+                    <a:extLst>
+                      <a:ext uri="{FF2B5EF4-FFF2-40B4-BE49-F238E27FC236}">
+                        <a16:creationId xmlns:a16="http://schemas.microsoft.com/office/drawing/2014/main" id="{DA81D0B8-1C11-3D45-E199-A8C5FFF4293C}"/>
+                      </a:ext>
+                    </a:extLst>
+                  </p:cNvPr>
+                  <p:cNvSpPr txBox="1"/>
+                  <p:nvPr/>
+                </p:nvSpPr>
+                <p:spPr>
+                  <a:xfrm>
+                    <a:off x="1674153" y="2771408"/>
+                    <a:ext cx="1286331" cy="307777"/>
+                  </a:xfrm>
+                  <a:prstGeom prst="rect">
+                    <a:avLst/>
+                  </a:prstGeom>
+                  <a:noFill/>
+                </p:spPr>
+                <p:txBody>
+                  <a:bodyPr wrap="square" rtlCol="0">
+                    <a:spAutoFit/>
+                  </a:bodyPr>
+                  <a:lstStyle/>
+                  <a:p>
+                    <a:pPr algn="ctr"/>
+                    <a:r>
+                      <a:rPr lang="en-US" sz="1400" dirty="0" err="1">
+                        <a:solidFill>
+                          <a:schemeClr val="bg1"/>
+                        </a:solidFill>
+                        <a:latin typeface="Dubai Light" panose="020B0303030403030204" pitchFamily="34" charset="-78"/>
+                        <a:cs typeface="Dubai Light" panose="020B0303030403030204" pitchFamily="34" charset="-78"/>
+                      </a:rPr>
+                      <a:t>Mundur</a:t>
+                    </a:r>
+                    <a:endParaRPr lang="id-ID" sz="1400" dirty="0">
+                      <a:solidFill>
+                        <a:schemeClr val="bg1"/>
+                      </a:solidFill>
+                      <a:latin typeface="Dubai Light" panose="020B0303030403030204" pitchFamily="34" charset="-78"/>
+                      <a:cs typeface="Dubai Light" panose="020B0303030403030204" pitchFamily="34" charset="-78"/>
+                    </a:endParaRPr>
+                  </a:p>
+                </p:txBody>
+              </p:sp>
+            </p:grpSp>
+          </p:grpSp>
+          <p:grpSp>
+            <p:nvGrpSpPr>
+              <p:cNvPr id="70" name="Group 69">
+                <a:extLst>
+                  <a:ext uri="{FF2B5EF4-FFF2-40B4-BE49-F238E27FC236}">
+                    <a16:creationId xmlns:a16="http://schemas.microsoft.com/office/drawing/2014/main" id="{7ECDEB64-FB97-465B-D443-AE54A53A69E4}"/>
+                  </a:ext>
+                </a:extLst>
+              </p:cNvPr>
+              <p:cNvGrpSpPr/>
+              <p:nvPr/>
+            </p:nvGrpSpPr>
+            <p:grpSpPr>
+              <a:xfrm>
+                <a:off x="5506643" y="1523423"/>
+                <a:ext cx="5408526" cy="2284508"/>
+                <a:chOff x="5592429" y="2051141"/>
+                <a:chExt cx="5408526" cy="2284508"/>
+              </a:xfrm>
+            </p:grpSpPr>
             <p:sp>
               <p:nvSpPr>
-                <p:cNvPr id="77" name="TextBox 76">
+                <p:cNvPr id="60" name="TextBox 59">
                   <a:extLst>
                     <a:ext uri="{FF2B5EF4-FFF2-40B4-BE49-F238E27FC236}">
-                      <a16:creationId xmlns:a16="http://schemas.microsoft.com/office/drawing/2014/main" id="{4D1C48E8-C921-720E-F501-0B7CAC245B52}"/>
+                      <a16:creationId xmlns:a16="http://schemas.microsoft.com/office/drawing/2014/main" id="{039ACFDE-50DF-6CB1-4718-FAA7B449CB36}"/>
                     </a:ext>
                   </a:extLst>
                 </p:cNvPr>
@@ -6904,8 +6986,8 @@
               </p:nvSpPr>
               <p:spPr>
                 <a:xfrm>
-                  <a:off x="2441432" y="1938558"/>
-                  <a:ext cx="1286331" cy="307777"/>
+                  <a:off x="8446880" y="2618341"/>
+                  <a:ext cx="2554075" cy="1200329"/>
                 </a:xfrm>
                 <a:prstGeom prst="rect">
                   <a:avLst/>
@@ -6918,18 +7000,181 @@
                 </a:bodyPr>
                 <a:lstStyle/>
                 <a:p>
-                  <a:pPr algn="ctr"/>
+                  <a:pPr>
+                    <a:spcAft>
+                      <a:spcPts val="1200"/>
+                    </a:spcAft>
+                  </a:pPr>
                   <a:r>
-                    <a:rPr lang="en-US" sz="1400" dirty="0">
+                    <a:rPr lang="en-US" b="1" dirty="0" err="1">
                       <a:solidFill>
                         <a:schemeClr val="bg1"/>
                       </a:solidFill>
                       <a:latin typeface="Dubai Light" panose="020B0303030403030204" pitchFamily="34" charset="-78"/>
                       <a:cs typeface="Dubai Light" panose="020B0303030403030204" pitchFamily="34" charset="-78"/>
                     </a:rPr>
-                    <a:t>Kanan</a:t>
+                    <a:t>Kamera</a:t>
                   </a:r>
-                  <a:endParaRPr lang="id-ID" sz="1400" dirty="0">
+                  <a:r>
+                    <a:rPr lang="en-US" b="1" dirty="0">
+                      <a:solidFill>
+                        <a:schemeClr val="bg1"/>
+                      </a:solidFill>
+                      <a:latin typeface="Dubai Light" panose="020B0303030403030204" pitchFamily="34" charset="-78"/>
+                      <a:cs typeface="Dubai Light" panose="020B0303030403030204" pitchFamily="34" charset="-78"/>
+                    </a:rPr>
+                    <a:t>:</a:t>
+                  </a:r>
+                  <a:br>
+                    <a:rPr lang="en-US" b="1" dirty="0">
+                      <a:solidFill>
+                        <a:schemeClr val="bg1"/>
+                      </a:solidFill>
+                      <a:latin typeface="Dubai Light" panose="020B0303030403030204" pitchFamily="34" charset="-78"/>
+                      <a:cs typeface="Dubai Light" panose="020B0303030403030204" pitchFamily="34" charset="-78"/>
+                    </a:rPr>
+                  </a:br>
+                  <a:r>
+                    <a:rPr lang="en-US" b="1" i="1" dirty="0">
+                      <a:solidFill>
+                        <a:schemeClr val="bg1"/>
+                      </a:solidFill>
+                      <a:latin typeface="Dubai Light" panose="020B0303030403030204" pitchFamily="34" charset="-78"/>
+                      <a:cs typeface="Dubai Light" panose="020B0303030403030204" pitchFamily="34" charset="-78"/>
+                    </a:rPr>
+                    <a:t>Left-click</a:t>
+                  </a:r>
+                  <a:r>
+                    <a:rPr lang="en-US" b="1" dirty="0">
+                      <a:solidFill>
+                        <a:schemeClr val="bg1"/>
+                      </a:solidFill>
+                      <a:latin typeface="Dubai Light" panose="020B0303030403030204" pitchFamily="34" charset="-78"/>
+                      <a:cs typeface="Dubai Light" panose="020B0303030403030204" pitchFamily="34" charset="-78"/>
+                    </a:rPr>
+                    <a:t>, </a:t>
+                  </a:r>
+                  <a:r>
+                    <a:rPr lang="en-US" b="1" dirty="0" err="1">
+                      <a:solidFill>
+                        <a:schemeClr val="bg1"/>
+                      </a:solidFill>
+                      <a:latin typeface="Dubai Light" panose="020B0303030403030204" pitchFamily="34" charset="-78"/>
+                      <a:cs typeface="Dubai Light" panose="020B0303030403030204" pitchFamily="34" charset="-78"/>
+                    </a:rPr>
+                    <a:t>tahan</a:t>
+                  </a:r>
+                  <a:r>
+                    <a:rPr lang="en-US" b="1" dirty="0">
+                      <a:solidFill>
+                        <a:schemeClr val="bg1"/>
+                      </a:solidFill>
+                      <a:latin typeface="Dubai Light" panose="020B0303030403030204" pitchFamily="34" charset="-78"/>
+                      <a:cs typeface="Dubai Light" panose="020B0303030403030204" pitchFamily="34" charset="-78"/>
+                    </a:rPr>
+                    <a:t>, dan </a:t>
+                  </a:r>
+                  <a:r>
+                    <a:rPr lang="en-US" b="1" dirty="0" err="1">
+                      <a:solidFill>
+                        <a:schemeClr val="bg1"/>
+                      </a:solidFill>
+                      <a:latin typeface="Dubai Light" panose="020B0303030403030204" pitchFamily="34" charset="-78"/>
+                      <a:cs typeface="Dubai Light" panose="020B0303030403030204" pitchFamily="34" charset="-78"/>
+                    </a:rPr>
+                    <a:t>geser</a:t>
+                  </a:r>
+                  <a:r>
+                    <a:rPr lang="en-US" dirty="0">
+                      <a:solidFill>
+                        <a:schemeClr val="bg1"/>
+                      </a:solidFill>
+                      <a:latin typeface="Dubai Light" panose="020B0303030403030204" pitchFamily="34" charset="-78"/>
+                      <a:cs typeface="Dubai Light" panose="020B0303030403030204" pitchFamily="34" charset="-78"/>
+                    </a:rPr>
+                    <a:t> untuk </a:t>
+                  </a:r>
+                  <a:r>
+                    <a:rPr lang="en-US" dirty="0" err="1">
+                      <a:solidFill>
+                        <a:schemeClr val="bg1"/>
+                      </a:solidFill>
+                      <a:latin typeface="Dubai Light" panose="020B0303030403030204" pitchFamily="34" charset="-78"/>
+                      <a:cs typeface="Dubai Light" panose="020B0303030403030204" pitchFamily="34" charset="-78"/>
+                    </a:rPr>
+                    <a:t>menggerakan</a:t>
+                  </a:r>
+                  <a:r>
+                    <a:rPr lang="en-US" dirty="0">
+                      <a:solidFill>
+                        <a:schemeClr val="bg1"/>
+                      </a:solidFill>
+                      <a:latin typeface="Dubai Light" panose="020B0303030403030204" pitchFamily="34" charset="-78"/>
+                      <a:cs typeface="Dubai Light" panose="020B0303030403030204" pitchFamily="34" charset="-78"/>
+                    </a:rPr>
+                    <a:t> </a:t>
+                  </a:r>
+                  <a:r>
+                    <a:rPr lang="en-US" dirty="0" err="1">
+                      <a:solidFill>
+                        <a:schemeClr val="bg1"/>
+                      </a:solidFill>
+                      <a:latin typeface="Dubai Light" panose="020B0303030403030204" pitchFamily="34" charset="-78"/>
+                      <a:cs typeface="Dubai Light" panose="020B0303030403030204" pitchFamily="34" charset="-78"/>
+                    </a:rPr>
+                    <a:t>kamera</a:t>
+                  </a:r>
+                  <a:r>
+                    <a:rPr lang="en-US" dirty="0">
+                      <a:solidFill>
+                        <a:schemeClr val="bg1"/>
+                      </a:solidFill>
+                      <a:latin typeface="Dubai Light" panose="020B0303030403030204" pitchFamily="34" charset="-78"/>
+                      <a:cs typeface="Dubai Light" panose="020B0303030403030204" pitchFamily="34" charset="-78"/>
+                    </a:rPr>
+                    <a:t> ke </a:t>
+                  </a:r>
+                  <a:r>
+                    <a:rPr lang="en-US" dirty="0" err="1">
+                      <a:solidFill>
+                        <a:schemeClr val="bg1"/>
+                      </a:solidFill>
+                      <a:latin typeface="Dubai Light" panose="020B0303030403030204" pitchFamily="34" charset="-78"/>
+                      <a:cs typeface="Dubai Light" panose="020B0303030403030204" pitchFamily="34" charset="-78"/>
+                    </a:rPr>
+                    <a:t>kanan</a:t>
+                  </a:r>
+                  <a:r>
+                    <a:rPr lang="en-US" dirty="0">
+                      <a:solidFill>
+                        <a:schemeClr val="bg1"/>
+                      </a:solidFill>
+                      <a:latin typeface="Dubai Light" panose="020B0303030403030204" pitchFamily="34" charset="-78"/>
+                      <a:cs typeface="Dubai Light" panose="020B0303030403030204" pitchFamily="34" charset="-78"/>
+                    </a:rPr>
+                    <a:t> dan </a:t>
+                  </a:r>
+                  <a:r>
+                    <a:rPr lang="en-US" dirty="0" err="1">
+                      <a:solidFill>
+                        <a:schemeClr val="bg1"/>
+                      </a:solidFill>
+                      <a:latin typeface="Dubai Light" panose="020B0303030403030204" pitchFamily="34" charset="-78"/>
+                      <a:cs typeface="Dubai Light" panose="020B0303030403030204" pitchFamily="34" charset="-78"/>
+                    </a:rPr>
+                    <a:t>kiri</a:t>
+                  </a:r>
+                  <a:r>
+                    <a:rPr lang="en-US" dirty="0">
+                      <a:solidFill>
+                        <a:schemeClr val="bg1"/>
+                      </a:solidFill>
+                      <a:latin typeface="Dubai Light" panose="020B0303030403030204" pitchFamily="34" charset="-78"/>
+                      <a:cs typeface="Dubai Light" panose="020B0303030403030204" pitchFamily="34" charset="-78"/>
+                    </a:rPr>
+                    <a:t>.</a:t>
+                  </a:r>
+                  <a:endParaRPr lang="id-ID" dirty="0">
                     <a:solidFill>
                       <a:schemeClr val="bg1"/>
                     </a:solidFill>
@@ -6939,12 +7184,240 @@
                 </a:p>
               </p:txBody>
             </p:sp>
+            <p:grpSp>
+              <p:nvGrpSpPr>
+                <p:cNvPr id="69" name="Group 68">
+                  <a:extLst>
+                    <a:ext uri="{FF2B5EF4-FFF2-40B4-BE49-F238E27FC236}">
+                      <a16:creationId xmlns:a16="http://schemas.microsoft.com/office/drawing/2014/main" id="{4865062F-1CF8-01E6-5156-1843F849CF7F}"/>
+                    </a:ext>
+                  </a:extLst>
+                </p:cNvPr>
+                <p:cNvGrpSpPr/>
+                <p:nvPr/>
+              </p:nvGrpSpPr>
+              <p:grpSpPr>
+                <a:xfrm>
+                  <a:off x="5592429" y="2051141"/>
+                  <a:ext cx="2790932" cy="2284508"/>
+                  <a:chOff x="5592429" y="2051141"/>
+                  <a:chExt cx="2790932" cy="2284508"/>
+                </a:xfrm>
+              </p:grpSpPr>
+              <p:pic>
+                <p:nvPicPr>
+                  <p:cNvPr id="59" name="Picture 58">
+                    <a:extLst>
+                      <a:ext uri="{FF2B5EF4-FFF2-40B4-BE49-F238E27FC236}">
+                        <a16:creationId xmlns:a16="http://schemas.microsoft.com/office/drawing/2014/main" id="{0E0C9CD0-7C2A-B4CC-416F-FC20DAE7DF63}"/>
+                      </a:ext>
+                    </a:extLst>
+                  </p:cNvPr>
+                  <p:cNvPicPr>
+                    <a:picLocks noChangeAspect="1"/>
+                  </p:cNvPicPr>
+                  <p:nvPr/>
+                </p:nvPicPr>
+                <p:blipFill>
+                  <a:blip r:embed="rId6">
+                    <a:extLst>
+                      <a:ext uri="{28A0092B-C50C-407E-A947-70E740481C1C}">
+                        <a14:useLocalDpi xmlns:a14="http://schemas.microsoft.com/office/drawing/2010/main" val="0"/>
+                      </a:ext>
+                    </a:extLst>
+                  </a:blip>
+                  <a:stretch>
+                    <a:fillRect/>
+                  </a:stretch>
+                </p:blipFill>
+                <p:spPr>
+                  <a:xfrm>
+                    <a:off x="6995195" y="2101362"/>
+                    <a:ext cx="1388166" cy="2234287"/>
+                  </a:xfrm>
+                  <a:prstGeom prst="rect">
+                    <a:avLst/>
+                  </a:prstGeom>
+                </p:spPr>
+              </p:pic>
+              <p:grpSp>
+                <p:nvGrpSpPr>
+                  <p:cNvPr id="68" name="Group 67">
+                    <a:extLst>
+                      <a:ext uri="{FF2B5EF4-FFF2-40B4-BE49-F238E27FC236}">
+                        <a16:creationId xmlns:a16="http://schemas.microsoft.com/office/drawing/2014/main" id="{617416FD-AF08-AD4E-B230-A206009A13F6}"/>
+                      </a:ext>
+                    </a:extLst>
+                  </p:cNvPr>
+                  <p:cNvGrpSpPr/>
+                  <p:nvPr/>
+                </p:nvGrpSpPr>
+                <p:grpSpPr>
+                  <a:xfrm>
+                    <a:off x="5592429" y="2051141"/>
+                    <a:ext cx="1374553" cy="369332"/>
+                    <a:chOff x="5592429" y="2051141"/>
+                    <a:chExt cx="1374553" cy="369332"/>
+                  </a:xfrm>
+                </p:grpSpPr>
+                <p:sp>
+                  <p:nvSpPr>
+                    <p:cNvPr id="61" name="TextBox 60">
+                      <a:extLst>
+                        <a:ext uri="{FF2B5EF4-FFF2-40B4-BE49-F238E27FC236}">
+                          <a16:creationId xmlns:a16="http://schemas.microsoft.com/office/drawing/2014/main" id="{AEA742C0-ADC6-D6CC-37E3-2439B914A8C2}"/>
+                        </a:ext>
+                      </a:extLst>
+                    </p:cNvPr>
+                    <p:cNvSpPr txBox="1"/>
+                    <p:nvPr/>
+                  </p:nvSpPr>
+                  <p:spPr>
+                    <a:xfrm>
+                      <a:off x="5592429" y="2051141"/>
+                      <a:ext cx="1120656" cy="369332"/>
+                    </a:xfrm>
+                    <a:prstGeom prst="rect">
+                      <a:avLst/>
+                    </a:prstGeom>
+                    <a:noFill/>
+                  </p:spPr>
+                  <p:txBody>
+                    <a:bodyPr wrap="square" rtlCol="0">
+                      <a:spAutoFit/>
+                    </a:bodyPr>
+                    <a:lstStyle/>
+                    <a:p>
+                      <a:pPr algn="ctr"/>
+                      <a:r>
+                        <a:rPr lang="en-US" i="1" dirty="0">
+                          <a:solidFill>
+                            <a:schemeClr val="bg1"/>
+                          </a:solidFill>
+                          <a:latin typeface="Aharoni" panose="02010803020104030203" pitchFamily="2" charset="-79"/>
+                          <a:cs typeface="Aharoni" panose="02010803020104030203" pitchFamily="2" charset="-79"/>
+                        </a:rPr>
+                        <a:t>Left-click</a:t>
+                      </a:r>
+                      <a:endParaRPr lang="id-ID" i="1" dirty="0">
+                        <a:solidFill>
+                          <a:schemeClr val="bg1"/>
+                        </a:solidFill>
+                        <a:latin typeface="Aharoni" panose="02010803020104030203" pitchFamily="2" charset="-79"/>
+                        <a:cs typeface="Aharoni" panose="02010803020104030203" pitchFamily="2" charset="-79"/>
+                      </a:endParaRPr>
+                    </a:p>
+                  </p:txBody>
+                </p:sp>
+                <p:cxnSp>
+                  <p:nvCxnSpPr>
+                    <p:cNvPr id="63" name="Straight Arrow Connector 62">
+                      <a:extLst>
+                        <a:ext uri="{FF2B5EF4-FFF2-40B4-BE49-F238E27FC236}">
+                          <a16:creationId xmlns:a16="http://schemas.microsoft.com/office/drawing/2014/main" id="{5C79E713-B342-8F1A-C896-1BED3734CD66}"/>
+                        </a:ext>
+                      </a:extLst>
+                    </p:cNvPr>
+                    <p:cNvCxnSpPr>
+                      <a:cxnSpLocks/>
+                    </p:cNvCxnSpPr>
+                    <p:nvPr/>
+                  </p:nvCxnSpPr>
+                  <p:spPr>
+                    <a:xfrm>
+                      <a:off x="6664113" y="2248108"/>
+                      <a:ext cx="302869" cy="58329"/>
+                    </a:xfrm>
+                    <a:prstGeom prst="straightConnector1">
+                      <a:avLst/>
+                    </a:prstGeom>
+                    <a:ln>
+                      <a:solidFill>
+                        <a:schemeClr val="bg1"/>
+                      </a:solidFill>
+                      <a:tailEnd type="triangle"/>
+                    </a:ln>
+                  </p:spPr>
+                  <p:style>
+                    <a:lnRef idx="1">
+                      <a:schemeClr val="accent1"/>
+                    </a:lnRef>
+                    <a:fillRef idx="0">
+                      <a:schemeClr val="accent1"/>
+                    </a:fillRef>
+                    <a:effectRef idx="0">
+                      <a:schemeClr val="accent1"/>
+                    </a:effectRef>
+                    <a:fontRef idx="minor">
+                      <a:schemeClr val="tx1"/>
+                    </a:fontRef>
+                  </p:style>
+                </p:cxnSp>
+              </p:grpSp>
+            </p:grpSp>
+          </p:grpSp>
+          <p:grpSp>
+            <p:nvGrpSpPr>
+              <p:cNvPr id="12" name="Group 11">
+                <a:extLst>
+                  <a:ext uri="{FF2B5EF4-FFF2-40B4-BE49-F238E27FC236}">
+                    <a16:creationId xmlns:a16="http://schemas.microsoft.com/office/drawing/2014/main" id="{0920F958-2027-C9B8-F099-65EB7DEFF22B}"/>
+                  </a:ext>
+                </a:extLst>
+              </p:cNvPr>
+              <p:cNvGrpSpPr/>
+              <p:nvPr/>
+            </p:nvGrpSpPr>
+            <p:grpSpPr>
+              <a:xfrm>
+                <a:off x="6984090" y="4139528"/>
+                <a:ext cx="4423186" cy="674341"/>
+                <a:chOff x="7069876" y="4060698"/>
+                <a:chExt cx="4423186" cy="674341"/>
+              </a:xfrm>
+            </p:grpSpPr>
+            <p:pic>
+              <p:nvPicPr>
+                <p:cNvPr id="10" name="Picture 9">
+                  <a:extLst>
+                    <a:ext uri="{FF2B5EF4-FFF2-40B4-BE49-F238E27FC236}">
+                      <a16:creationId xmlns:a16="http://schemas.microsoft.com/office/drawing/2014/main" id="{5478A8D4-9C13-695E-02EE-26E3CAF7CEC7}"/>
+                    </a:ext>
+                  </a:extLst>
+                </p:cNvPr>
+                <p:cNvPicPr>
+                  <a:picLocks noChangeAspect="1"/>
+                </p:cNvPicPr>
+                <p:nvPr/>
+              </p:nvPicPr>
+              <p:blipFill>
+                <a:blip r:embed="rId7">
+                  <a:extLst>
+                    <a:ext uri="{28A0092B-C50C-407E-A947-70E740481C1C}">
+                      <a14:useLocalDpi xmlns:a14="http://schemas.microsoft.com/office/drawing/2010/main" val="0"/>
+                    </a:ext>
+                  </a:extLst>
+                </a:blip>
+                <a:stretch>
+                  <a:fillRect/>
+                </a:stretch>
+              </p:blipFill>
+              <p:spPr>
+                <a:xfrm>
+                  <a:off x="7069876" y="4060698"/>
+                  <a:ext cx="1238803" cy="646332"/>
+                </a:xfrm>
+                <a:prstGeom prst="rect">
+                  <a:avLst/>
+                </a:prstGeom>
+              </p:spPr>
+            </p:pic>
             <p:sp>
               <p:nvSpPr>
-                <p:cNvPr id="78" name="TextBox 77">
+                <p:cNvPr id="11" name="TextBox 10">
                   <a:extLst>
                     <a:ext uri="{FF2B5EF4-FFF2-40B4-BE49-F238E27FC236}">
-                      <a16:creationId xmlns:a16="http://schemas.microsoft.com/office/drawing/2014/main" id="{DA81D0B8-1C11-3D45-E199-A8C5FFF4293C}"/>
+                      <a16:creationId xmlns:a16="http://schemas.microsoft.com/office/drawing/2014/main" id="{76BBA7FF-76FD-298A-66CF-0923D8215ACE}"/>
                     </a:ext>
                   </a:extLst>
                 </p:cNvPr>
@@ -6953,8 +7426,8 @@
               </p:nvSpPr>
               <p:spPr>
                 <a:xfrm>
-                  <a:off x="1674153" y="2771408"/>
-                  <a:ext cx="1286331" cy="307777"/>
+                  <a:off x="8383362" y="4088708"/>
+                  <a:ext cx="3109700" cy="646331"/>
                 </a:xfrm>
                 <a:prstGeom prst="rect">
                   <a:avLst/>
@@ -6967,18 +7440,71 @@
                 </a:bodyPr>
                 <a:lstStyle/>
                 <a:p>
-                  <a:pPr algn="ctr"/>
+                  <a:pPr>
+                    <a:spcAft>
+                      <a:spcPts val="1200"/>
+                    </a:spcAft>
+                  </a:pPr>
                   <a:r>
-                    <a:rPr lang="en-US" sz="1400" dirty="0" err="1">
+                    <a:rPr lang="en-US" b="1" dirty="0">
                       <a:solidFill>
                         <a:schemeClr val="bg1"/>
                       </a:solidFill>
                       <a:latin typeface="Dubai Light" panose="020B0303030403030204" pitchFamily="34" charset="-78"/>
                       <a:cs typeface="Dubai Light" panose="020B0303030403030204" pitchFamily="34" charset="-78"/>
                     </a:rPr>
-                    <a:t>Mundur</a:t>
+                    <a:t>Pause:</a:t>
                   </a:r>
-                  <a:endParaRPr lang="id-ID" sz="1400" dirty="0">
+                  <a:br>
+                    <a:rPr lang="en-US" b="1" dirty="0">
+                      <a:solidFill>
+                        <a:schemeClr val="bg1"/>
+                      </a:solidFill>
+                      <a:latin typeface="Dubai Light" panose="020B0303030403030204" pitchFamily="34" charset="-78"/>
+                      <a:cs typeface="Dubai Light" panose="020B0303030403030204" pitchFamily="34" charset="-78"/>
+                    </a:rPr>
+                  </a:br>
+                  <a:r>
+                    <a:rPr lang="en-US" dirty="0" err="1">
+                      <a:solidFill>
+                        <a:schemeClr val="bg1"/>
+                      </a:solidFill>
+                      <a:latin typeface="Dubai Light" panose="020B0303030403030204" pitchFamily="34" charset="-78"/>
+                      <a:cs typeface="Dubai Light" panose="020B0303030403030204" pitchFamily="34" charset="-78"/>
+                    </a:rPr>
+                    <a:t>Gunakan</a:t>
+                  </a:r>
+                  <a:r>
+                    <a:rPr lang="en-US" dirty="0">
+                      <a:solidFill>
+                        <a:schemeClr val="bg1"/>
+                      </a:solidFill>
+                      <a:latin typeface="Dubai Light" panose="020B0303030403030204" pitchFamily="34" charset="-78"/>
+                      <a:cs typeface="Dubai Light" panose="020B0303030403030204" pitchFamily="34" charset="-78"/>
+                    </a:rPr>
+                    <a:t> </a:t>
+                  </a:r>
+                  <a:r>
+                    <a:rPr lang="en-US" b="1" dirty="0">
+                      <a:solidFill>
+                        <a:schemeClr val="bg1"/>
+                      </a:solidFill>
+                      <a:latin typeface="Dubai Light" panose="020B0303030403030204" pitchFamily="34" charset="-78"/>
+                      <a:cs typeface="Dubai Light" panose="020B0303030403030204" pitchFamily="34" charset="-78"/>
+                    </a:rPr>
+                    <a:t>ESC / P</a:t>
+                  </a:r>
+                  <a:r>
+                    <a:rPr lang="en-US" dirty="0">
+                      <a:solidFill>
+                        <a:schemeClr val="bg1"/>
+                      </a:solidFill>
+                      <a:latin typeface="Dubai Light" panose="020B0303030403030204" pitchFamily="34" charset="-78"/>
+                      <a:cs typeface="Dubai Light" panose="020B0303030403030204" pitchFamily="34" charset="-78"/>
+                    </a:rPr>
+                    <a:t> untuk pause.</a:t>
+                  </a:r>
+                  <a:endParaRPr lang="id-ID" dirty="0">
                     <a:solidFill>
                       <a:schemeClr val="bg1"/>
                     </a:solidFill>
@@ -6992,10 +7518,10 @@
         </p:grpSp>
         <p:grpSp>
           <p:nvGrpSpPr>
-            <p:cNvPr id="70" name="Group 69">
+            <p:cNvPr id="9" name="Group 8">
               <a:extLst>
                 <a:ext uri="{FF2B5EF4-FFF2-40B4-BE49-F238E27FC236}">
-                  <a16:creationId xmlns:a16="http://schemas.microsoft.com/office/drawing/2014/main" id="{7ECDEB64-FB97-465B-D443-AE54A53A69E4}"/>
+                  <a16:creationId xmlns:a16="http://schemas.microsoft.com/office/drawing/2014/main" id="{A55BE46D-1A65-D3B9-2F73-E6A0AB831B04}"/>
                 </a:ext>
               </a:extLst>
             </p:cNvPr>
@@ -7004,18 +7530,54 @@
           </p:nvGrpSpPr>
           <p:grpSpPr>
             <a:xfrm>
-              <a:off x="5506643" y="1523423"/>
-              <a:ext cx="5408526" cy="2284508"/>
-              <a:chOff x="5592429" y="2051141"/>
-              <a:chExt cx="5408526" cy="2284508"/>
+              <a:off x="6578327" y="4774652"/>
+              <a:ext cx="4287992" cy="1743352"/>
+              <a:chOff x="6578327" y="4774652"/>
+              <a:chExt cx="4287992" cy="1743352"/>
             </a:xfrm>
           </p:grpSpPr>
+          <p:pic>
+            <p:nvPicPr>
+              <p:cNvPr id="7" name="Picture 6">
+                <a:extLst>
+                  <a:ext uri="{FF2B5EF4-FFF2-40B4-BE49-F238E27FC236}">
+                    <a16:creationId xmlns:a16="http://schemas.microsoft.com/office/drawing/2014/main" id="{BF872A71-864C-8708-BE39-AA91C4043FD4}"/>
+                  </a:ext>
+                </a:extLst>
+              </p:cNvPr>
+              <p:cNvPicPr>
+                <a:picLocks noChangeAspect="1"/>
+              </p:cNvPicPr>
+              <p:nvPr/>
+            </p:nvPicPr>
+            <p:blipFill>
+              <a:blip r:embed="rId8">
+                <a:extLst>
+                  <a:ext uri="{28A0092B-C50C-407E-A947-70E740481C1C}">
+                    <a14:useLocalDpi xmlns:a14="http://schemas.microsoft.com/office/drawing/2010/main" val="0"/>
+                  </a:ext>
+                </a:extLst>
+              </a:blip>
+              <a:stretch>
+                <a:fillRect/>
+              </a:stretch>
+            </p:blipFill>
+            <p:spPr>
+              <a:xfrm>
+                <a:off x="6578327" y="4774652"/>
+                <a:ext cx="1847953" cy="1743352"/>
+              </a:xfrm>
+              <a:prstGeom prst="rect">
+                <a:avLst/>
+              </a:prstGeom>
+            </p:spPr>
+          </p:pic>
           <p:sp>
             <p:nvSpPr>
-              <p:cNvPr id="60" name="TextBox 59">
+              <p:cNvPr id="8" name="TextBox 7">
                 <a:extLst>
                   <a:ext uri="{FF2B5EF4-FFF2-40B4-BE49-F238E27FC236}">
-                    <a16:creationId xmlns:a16="http://schemas.microsoft.com/office/drawing/2014/main" id="{039ACFDE-50DF-6CB1-4718-FAA7B449CB36}"/>
+                    <a16:creationId xmlns:a16="http://schemas.microsoft.com/office/drawing/2014/main" id="{41BAEA57-0D65-7843-C119-BF6D2641CC3E}"/>
                   </a:ext>
                 </a:extLst>
               </p:cNvPr>
@@ -7024,8 +7586,8 @@
             </p:nvSpPr>
             <p:spPr>
               <a:xfrm>
-                <a:off x="8446880" y="2618341"/>
-                <a:ext cx="2554075" cy="1200329"/>
+                <a:off x="8133743" y="5397906"/>
+                <a:ext cx="2732576" cy="646331"/>
               </a:xfrm>
               <a:prstGeom prst="rect">
                 <a:avLst/>
@@ -7051,7 +7613,7 @@
                     <a:latin typeface="Dubai Light" panose="020B0303030403030204" pitchFamily="34" charset="-78"/>
                     <a:cs typeface="Dubai Light" panose="020B0303030403030204" pitchFamily="34" charset="-78"/>
                   </a:rPr>
-                  <a:t>Kamera</a:t>
+                  <a:t>Rintangan</a:t>
                 </a:r>
                 <a:r>
                   <a:rPr lang="en-US" b="1" dirty="0">
@@ -7073,56 +7635,6 @@
                   </a:rPr>
                 </a:br>
                 <a:r>
-                  <a:rPr lang="en-US" b="1" i="1" dirty="0">
-                    <a:solidFill>
-                      <a:schemeClr val="bg1"/>
-                    </a:solidFill>
-                    <a:latin typeface="Dubai Light" panose="020B0303030403030204" pitchFamily="34" charset="-78"/>
-                    <a:cs typeface="Dubai Light" panose="020B0303030403030204" pitchFamily="34" charset="-78"/>
-                  </a:rPr>
-                  <a:t>Left-click</a:t>
-                </a:r>
-                <a:r>
-                  <a:rPr lang="en-US" b="1" dirty="0">
-                    <a:solidFill>
-                      <a:schemeClr val="bg1"/>
-                    </a:solidFill>
-                    <a:latin typeface="Dubai Light" panose="020B0303030403030204" pitchFamily="34" charset="-78"/>
-                    <a:cs typeface="Dubai Light" panose="020B0303030403030204" pitchFamily="34" charset="-78"/>
-                  </a:rPr>
-                  <a:t>, </a:t>
-                </a:r>
-                <a:r>
-                  <a:rPr lang="en-US" b="1" dirty="0" err="1">
-                    <a:solidFill>
-                      <a:schemeClr val="bg1"/>
-                    </a:solidFill>
-                    <a:latin typeface="Dubai Light" panose="020B0303030403030204" pitchFamily="34" charset="-78"/>
-                    <a:cs typeface="Dubai Light" panose="020B0303030403030204" pitchFamily="34" charset="-78"/>
-                  </a:rPr>
-                  <a:t>tahan</a:t>
-                </a:r>
-                <a:r>
-                  <a:rPr lang="en-US" b="1" dirty="0">
-                    <a:solidFill>
-                      <a:schemeClr val="bg1"/>
-                    </a:solidFill>
-                    <a:latin typeface="Dubai Light" panose="020B0303030403030204" pitchFamily="34" charset="-78"/>
-                    <a:cs typeface="Dubai Light" panose="020B0303030403030204" pitchFamily="34" charset="-78"/>
-                  </a:rPr>
-                  <a:t>, dan </a:t>
-                </a:r>
-                <a:r>
-                  <a:rPr lang="en-US" b="1" dirty="0" err="1">
-                    <a:solidFill>
-                      <a:schemeClr val="bg1"/>
-                    </a:solidFill>
-                    <a:latin typeface="Dubai Light" panose="020B0303030403030204" pitchFamily="34" charset="-78"/>
-                    <a:cs typeface="Dubai Light" panose="020B0303030403030204" pitchFamily="34" charset="-78"/>
-                  </a:rPr>
-                  <a:t>geser</a:t>
-                </a:r>
-                <a:r>
                   <a:rPr lang="en-US" dirty="0">
                     <a:solidFill>
                       <a:schemeClr val="bg1"/>
@@ -7130,7 +7642,7 @@
                     <a:latin typeface="Dubai Light" panose="020B0303030403030204" pitchFamily="34" charset="-78"/>
                     <a:cs typeface="Dubai Light" panose="020B0303030403030204" pitchFamily="34" charset="-78"/>
                   </a:rPr>
-                  <a:t> untuk </a:t>
+                  <a:t>Jangan </a:t>
                 </a:r>
                 <a:r>
                   <a:rPr lang="en-US" dirty="0" err="1">
@@ -7140,7 +7652,7 @@
                     <a:latin typeface="Dubai Light" panose="020B0303030403030204" pitchFamily="34" charset="-78"/>
                     <a:cs typeface="Dubai Light" panose="020B0303030403030204" pitchFamily="34" charset="-78"/>
                   </a:rPr>
-                  <a:t>menggerakan</a:t>
+                  <a:t>sampai</a:t>
                 </a:r>
                 <a:r>
                   <a:rPr lang="en-US" dirty="0">
@@ -7160,7 +7672,7 @@
                     <a:latin typeface="Dubai Light" panose="020B0303030403030204" pitchFamily="34" charset="-78"/>
                     <a:cs typeface="Dubai Light" panose="020B0303030403030204" pitchFamily="34" charset="-78"/>
                   </a:rPr>
-                  <a:t>kamera</a:t>
+                  <a:t>terkena</a:t>
                 </a:r>
                 <a:r>
                   <a:rPr lang="en-US" dirty="0">
@@ -7170,377 +7682,7 @@
                     <a:latin typeface="Dubai Light" panose="020B0303030403030204" pitchFamily="34" charset="-78"/>
                     <a:cs typeface="Dubai Light" panose="020B0303030403030204" pitchFamily="34" charset="-78"/>
                   </a:rPr>
-                  <a:t> ke </a:t>
-                </a:r>
-                <a:r>
-                  <a:rPr lang="en-US" dirty="0" err="1">
-                    <a:solidFill>
-                      <a:schemeClr val="bg1"/>
-                    </a:solidFill>
-                    <a:latin typeface="Dubai Light" panose="020B0303030403030204" pitchFamily="34" charset="-78"/>
-                    <a:cs typeface="Dubai Light" panose="020B0303030403030204" pitchFamily="34" charset="-78"/>
-                  </a:rPr>
-                  <a:t>kanan</a:t>
-                </a:r>
-                <a:r>
-                  <a:rPr lang="en-US" dirty="0">
-                    <a:solidFill>
-                      <a:schemeClr val="bg1"/>
-                    </a:solidFill>
-                    <a:latin typeface="Dubai Light" panose="020B0303030403030204" pitchFamily="34" charset="-78"/>
-                    <a:cs typeface="Dubai Light" panose="020B0303030403030204" pitchFamily="34" charset="-78"/>
-                  </a:rPr>
-                  <a:t> dan </a:t>
-                </a:r>
-                <a:r>
-                  <a:rPr lang="en-US" dirty="0" err="1">
-                    <a:solidFill>
-                      <a:schemeClr val="bg1"/>
-                    </a:solidFill>
-                    <a:latin typeface="Dubai Light" panose="020B0303030403030204" pitchFamily="34" charset="-78"/>
-                    <a:cs typeface="Dubai Light" panose="020B0303030403030204" pitchFamily="34" charset="-78"/>
-                  </a:rPr>
-                  <a:t>kiri</a:t>
-                </a:r>
-                <a:r>
-                  <a:rPr lang="en-US" dirty="0">
-                    <a:solidFill>
-                      <a:schemeClr val="bg1"/>
-                    </a:solidFill>
-                    <a:latin typeface="Dubai Light" panose="020B0303030403030204" pitchFamily="34" charset="-78"/>
-                    <a:cs typeface="Dubai Light" panose="020B0303030403030204" pitchFamily="34" charset="-78"/>
-                  </a:rPr>
-                  <a:t>.</a:t>
-                </a:r>
-                <a:endParaRPr lang="id-ID" dirty="0">
-                  <a:solidFill>
-                    <a:schemeClr val="bg1"/>
-                  </a:solidFill>
-                  <a:latin typeface="Dubai Light" panose="020B0303030403030204" pitchFamily="34" charset="-78"/>
-                  <a:cs typeface="Dubai Light" panose="020B0303030403030204" pitchFamily="34" charset="-78"/>
-                </a:endParaRPr>
-              </a:p>
-            </p:txBody>
-          </p:sp>
-          <p:grpSp>
-            <p:nvGrpSpPr>
-              <p:cNvPr id="69" name="Group 68">
-                <a:extLst>
-                  <a:ext uri="{FF2B5EF4-FFF2-40B4-BE49-F238E27FC236}">
-                    <a16:creationId xmlns:a16="http://schemas.microsoft.com/office/drawing/2014/main" id="{4865062F-1CF8-01E6-5156-1843F849CF7F}"/>
-                  </a:ext>
-                </a:extLst>
-              </p:cNvPr>
-              <p:cNvGrpSpPr/>
-              <p:nvPr/>
-            </p:nvGrpSpPr>
-            <p:grpSpPr>
-              <a:xfrm>
-                <a:off x="5592429" y="2051141"/>
-                <a:ext cx="2790932" cy="2284508"/>
-                <a:chOff x="5592429" y="2051141"/>
-                <a:chExt cx="2790932" cy="2284508"/>
-              </a:xfrm>
-            </p:grpSpPr>
-            <p:pic>
-              <p:nvPicPr>
-                <p:cNvPr id="59" name="Picture 58">
-                  <a:extLst>
-                    <a:ext uri="{FF2B5EF4-FFF2-40B4-BE49-F238E27FC236}">
-                      <a16:creationId xmlns:a16="http://schemas.microsoft.com/office/drawing/2014/main" id="{0E0C9CD0-7C2A-B4CC-416F-FC20DAE7DF63}"/>
-                    </a:ext>
-                  </a:extLst>
-                </p:cNvPr>
-                <p:cNvPicPr>
-                  <a:picLocks noChangeAspect="1"/>
-                </p:cNvPicPr>
-                <p:nvPr/>
-              </p:nvPicPr>
-              <p:blipFill>
-                <a:blip r:embed="rId6">
-                  <a:extLst>
-                    <a:ext uri="{28A0092B-C50C-407E-A947-70E740481C1C}">
-                      <a14:useLocalDpi xmlns:a14="http://schemas.microsoft.com/office/drawing/2010/main" val="0"/>
-                    </a:ext>
-                  </a:extLst>
-                </a:blip>
-                <a:stretch>
-                  <a:fillRect/>
-                </a:stretch>
-              </p:blipFill>
-              <p:spPr>
-                <a:xfrm>
-                  <a:off x="6995195" y="2101362"/>
-                  <a:ext cx="1388166" cy="2234287"/>
-                </a:xfrm>
-                <a:prstGeom prst="rect">
-                  <a:avLst/>
-                </a:prstGeom>
-              </p:spPr>
-            </p:pic>
-            <p:grpSp>
-              <p:nvGrpSpPr>
-                <p:cNvPr id="68" name="Group 67">
-                  <a:extLst>
-                    <a:ext uri="{FF2B5EF4-FFF2-40B4-BE49-F238E27FC236}">
-                      <a16:creationId xmlns:a16="http://schemas.microsoft.com/office/drawing/2014/main" id="{617416FD-AF08-AD4E-B230-A206009A13F6}"/>
-                    </a:ext>
-                  </a:extLst>
-                </p:cNvPr>
-                <p:cNvGrpSpPr/>
-                <p:nvPr/>
-              </p:nvGrpSpPr>
-              <p:grpSpPr>
-                <a:xfrm>
-                  <a:off x="5592429" y="2051141"/>
-                  <a:ext cx="1374553" cy="369332"/>
-                  <a:chOff x="5592429" y="2051141"/>
-                  <a:chExt cx="1374553" cy="369332"/>
-                </a:xfrm>
-              </p:grpSpPr>
-              <p:sp>
-                <p:nvSpPr>
-                  <p:cNvPr id="61" name="TextBox 60">
-                    <a:extLst>
-                      <a:ext uri="{FF2B5EF4-FFF2-40B4-BE49-F238E27FC236}">
-                        <a16:creationId xmlns:a16="http://schemas.microsoft.com/office/drawing/2014/main" id="{AEA742C0-ADC6-D6CC-37E3-2439B914A8C2}"/>
-                      </a:ext>
-                    </a:extLst>
-                  </p:cNvPr>
-                  <p:cNvSpPr txBox="1"/>
-                  <p:nvPr/>
-                </p:nvSpPr>
-                <p:spPr>
-                  <a:xfrm>
-                    <a:off x="5592429" y="2051141"/>
-                    <a:ext cx="1120656" cy="369332"/>
-                  </a:xfrm>
-                  <a:prstGeom prst="rect">
-                    <a:avLst/>
-                  </a:prstGeom>
-                  <a:noFill/>
-                </p:spPr>
-                <p:txBody>
-                  <a:bodyPr wrap="square" rtlCol="0">
-                    <a:spAutoFit/>
-                  </a:bodyPr>
-                  <a:lstStyle/>
-                  <a:p>
-                    <a:pPr algn="ctr"/>
-                    <a:r>
-                      <a:rPr lang="en-US" i="1" dirty="0">
-                        <a:solidFill>
-                          <a:schemeClr val="bg1"/>
-                        </a:solidFill>
-                        <a:latin typeface="Aharoni" panose="02010803020104030203" pitchFamily="2" charset="-79"/>
-                        <a:cs typeface="Aharoni" panose="02010803020104030203" pitchFamily="2" charset="-79"/>
-                      </a:rPr>
-                      <a:t>Left-click</a:t>
-                    </a:r>
-                    <a:endParaRPr lang="id-ID" i="1" dirty="0">
-                      <a:solidFill>
-                        <a:schemeClr val="bg1"/>
-                      </a:solidFill>
-                      <a:latin typeface="Aharoni" panose="02010803020104030203" pitchFamily="2" charset="-79"/>
-                      <a:cs typeface="Aharoni" panose="02010803020104030203" pitchFamily="2" charset="-79"/>
-                    </a:endParaRPr>
-                  </a:p>
-                </p:txBody>
-              </p:sp>
-              <p:cxnSp>
-                <p:nvCxnSpPr>
-                  <p:cNvPr id="63" name="Straight Arrow Connector 62">
-                    <a:extLst>
-                      <a:ext uri="{FF2B5EF4-FFF2-40B4-BE49-F238E27FC236}">
-                        <a16:creationId xmlns:a16="http://schemas.microsoft.com/office/drawing/2014/main" id="{5C79E713-B342-8F1A-C896-1BED3734CD66}"/>
-                      </a:ext>
-                    </a:extLst>
-                  </p:cNvPr>
-                  <p:cNvCxnSpPr>
-                    <a:cxnSpLocks/>
-                  </p:cNvCxnSpPr>
-                  <p:nvPr/>
-                </p:nvCxnSpPr>
-                <p:spPr>
-                  <a:xfrm>
-                    <a:off x="6664113" y="2248108"/>
-                    <a:ext cx="302869" cy="58329"/>
-                  </a:xfrm>
-                  <a:prstGeom prst="straightConnector1">
-                    <a:avLst/>
-                  </a:prstGeom>
-                  <a:ln>
-                    <a:solidFill>
-                      <a:schemeClr val="bg1"/>
-                    </a:solidFill>
-                    <a:tailEnd type="triangle"/>
-                  </a:ln>
-                </p:spPr>
-                <p:style>
-                  <a:lnRef idx="1">
-                    <a:schemeClr val="accent1"/>
-                  </a:lnRef>
-                  <a:fillRef idx="0">
-                    <a:schemeClr val="accent1"/>
-                  </a:fillRef>
-                  <a:effectRef idx="0">
-                    <a:schemeClr val="accent1"/>
-                  </a:effectRef>
-                  <a:fontRef idx="minor">
-                    <a:schemeClr val="tx1"/>
-                  </a:fontRef>
-                </p:style>
-              </p:cxnSp>
-            </p:grpSp>
-          </p:grpSp>
-        </p:grpSp>
-        <p:grpSp>
-          <p:nvGrpSpPr>
-            <p:cNvPr id="12" name="Group 11">
-              <a:extLst>
-                <a:ext uri="{FF2B5EF4-FFF2-40B4-BE49-F238E27FC236}">
-                  <a16:creationId xmlns:a16="http://schemas.microsoft.com/office/drawing/2014/main" id="{0920F958-2027-C9B8-F099-65EB7DEFF22B}"/>
-                </a:ext>
-              </a:extLst>
-            </p:cNvPr>
-            <p:cNvGrpSpPr/>
-            <p:nvPr/>
-          </p:nvGrpSpPr>
-          <p:grpSpPr>
-            <a:xfrm>
-              <a:off x="6984090" y="4139528"/>
-              <a:ext cx="4423186" cy="674341"/>
-              <a:chOff x="7069876" y="4060698"/>
-              <a:chExt cx="4423186" cy="674341"/>
-            </a:xfrm>
-          </p:grpSpPr>
-          <p:pic>
-            <p:nvPicPr>
-              <p:cNvPr id="10" name="Picture 9">
-                <a:extLst>
-                  <a:ext uri="{FF2B5EF4-FFF2-40B4-BE49-F238E27FC236}">
-                    <a16:creationId xmlns:a16="http://schemas.microsoft.com/office/drawing/2014/main" id="{5478A8D4-9C13-695E-02EE-26E3CAF7CEC7}"/>
-                  </a:ext>
-                </a:extLst>
-              </p:cNvPr>
-              <p:cNvPicPr>
-                <a:picLocks noChangeAspect="1"/>
-              </p:cNvPicPr>
-              <p:nvPr/>
-            </p:nvPicPr>
-            <p:blipFill>
-              <a:blip r:embed="rId7">
-                <a:extLst>
-                  <a:ext uri="{28A0092B-C50C-407E-A947-70E740481C1C}">
-                    <a14:useLocalDpi xmlns:a14="http://schemas.microsoft.com/office/drawing/2010/main" val="0"/>
-                  </a:ext>
-                </a:extLst>
-              </a:blip>
-              <a:stretch>
-                <a:fillRect/>
-              </a:stretch>
-            </p:blipFill>
-            <p:spPr>
-              <a:xfrm>
-                <a:off x="7069876" y="4060698"/>
-                <a:ext cx="1238803" cy="646332"/>
-              </a:xfrm>
-              <a:prstGeom prst="rect">
-                <a:avLst/>
-              </a:prstGeom>
-            </p:spPr>
-          </p:pic>
-          <p:sp>
-            <p:nvSpPr>
-              <p:cNvPr id="11" name="TextBox 10">
-                <a:extLst>
-                  <a:ext uri="{FF2B5EF4-FFF2-40B4-BE49-F238E27FC236}">
-                    <a16:creationId xmlns:a16="http://schemas.microsoft.com/office/drawing/2014/main" id="{76BBA7FF-76FD-298A-66CF-0923D8215ACE}"/>
-                  </a:ext>
-                </a:extLst>
-              </p:cNvPr>
-              <p:cNvSpPr txBox="1"/>
-              <p:nvPr/>
-            </p:nvSpPr>
-            <p:spPr>
-              <a:xfrm>
-                <a:off x="8383362" y="4088708"/>
-                <a:ext cx="3109700" cy="646331"/>
-              </a:xfrm>
-              <a:prstGeom prst="rect">
-                <a:avLst/>
-              </a:prstGeom>
-              <a:noFill/>
-            </p:spPr>
-            <p:txBody>
-              <a:bodyPr wrap="square" rtlCol="0">
-                <a:spAutoFit/>
-              </a:bodyPr>
-              <a:lstStyle/>
-              <a:p>
-                <a:pPr>
-                  <a:spcAft>
-                    <a:spcPts val="1200"/>
-                  </a:spcAft>
-                </a:pPr>
-                <a:r>
-                  <a:rPr lang="en-US" b="1" dirty="0">
-                    <a:solidFill>
-                      <a:schemeClr val="bg1"/>
-                    </a:solidFill>
-                    <a:latin typeface="Dubai Light" panose="020B0303030403030204" pitchFamily="34" charset="-78"/>
-                    <a:cs typeface="Dubai Light" panose="020B0303030403030204" pitchFamily="34" charset="-78"/>
-                  </a:rPr>
-                  <a:t>Pause:</a:t>
-                </a:r>
-                <a:br>
-                  <a:rPr lang="en-US" b="1" dirty="0">
-                    <a:solidFill>
-                      <a:schemeClr val="bg1"/>
-                    </a:solidFill>
-                    <a:latin typeface="Dubai Light" panose="020B0303030403030204" pitchFamily="34" charset="-78"/>
-                    <a:cs typeface="Dubai Light" panose="020B0303030403030204" pitchFamily="34" charset="-78"/>
-                  </a:rPr>
-                </a:br>
-                <a:r>
-                  <a:rPr lang="en-US" dirty="0" err="1">
-                    <a:solidFill>
-                      <a:schemeClr val="bg1"/>
-                    </a:solidFill>
-                    <a:latin typeface="Dubai Light" panose="020B0303030403030204" pitchFamily="34" charset="-78"/>
-                    <a:cs typeface="Dubai Light" panose="020B0303030403030204" pitchFamily="34" charset="-78"/>
-                  </a:rPr>
-                  <a:t>Gunakan</a:t>
-                </a:r>
-                <a:r>
-                  <a:rPr lang="en-US" dirty="0">
-                    <a:solidFill>
-                      <a:schemeClr val="bg1"/>
-                    </a:solidFill>
-                    <a:latin typeface="Dubai Light" panose="020B0303030403030204" pitchFamily="34" charset="-78"/>
-                    <a:cs typeface="Dubai Light" panose="020B0303030403030204" pitchFamily="34" charset="-78"/>
-                  </a:rPr>
-                  <a:t> </a:t>
-                </a:r>
-                <a:r>
-                  <a:rPr lang="en-US" b="1" dirty="0">
-                    <a:solidFill>
-                      <a:schemeClr val="bg1"/>
-                    </a:solidFill>
-                    <a:latin typeface="Dubai Light" panose="020B0303030403030204" pitchFamily="34" charset="-78"/>
-                    <a:cs typeface="Dubai Light" panose="020B0303030403030204" pitchFamily="34" charset="-78"/>
-                  </a:rPr>
-                  <a:t>ESC / P</a:t>
-                </a:r>
-                <a:r>
-                  <a:rPr lang="en-US" dirty="0">
-                    <a:solidFill>
-                      <a:schemeClr val="bg1"/>
-                    </a:solidFill>
-                    <a:latin typeface="Dubai Light" panose="020B0303030403030204" pitchFamily="34" charset="-78"/>
-                    <a:cs typeface="Dubai Light" panose="020B0303030403030204" pitchFamily="34" charset="-78"/>
-                  </a:rPr>
-                  <a:t> untuk pause.</a:t>
+                  <a:t>!</a:t>
                 </a:r>
                 <a:endParaRPr lang="id-ID" dirty="0">
                   <a:solidFill>
@@ -7568,6 +7710,36 @@
 </file>
 
 <file path=ppt/slides/slide14.xml><?xml version="1.0" encoding="utf-8"?>
+<p:sld xmlns:a="http://schemas.openxmlformats.org/drawingml/2006/main" xmlns:r="http://schemas.openxmlformats.org/officeDocument/2006/relationships" xmlns:p="http://schemas.openxmlformats.org/presentationml/2006/main">
+  <p:cSld>
+    <p:spTree>
+      <p:nvGrpSpPr>
+        <p:cNvPr id="1" name=""/>
+        <p:cNvGrpSpPr/>
+        <p:nvPr/>
+      </p:nvGrpSpPr>
+      <p:grpSpPr>
+        <a:xfrm>
+          <a:off x="0" y="0"/>
+          <a:ext cx="0" cy="0"/>
+          <a:chOff x="0" y="0"/>
+          <a:chExt cx="0" cy="0"/>
+        </a:xfrm>
+      </p:grpSpPr>
+    </p:spTree>
+    <p:extLst>
+      <p:ext uri="{BB962C8B-B14F-4D97-AF65-F5344CB8AC3E}">
+        <p14:creationId xmlns:p14="http://schemas.microsoft.com/office/powerpoint/2010/main" val="896190517"/>
+      </p:ext>
+    </p:extLst>
+  </p:cSld>
+  <p:clrMapOvr>
+    <a:masterClrMapping/>
+  </p:clrMapOvr>
+</p:sld>
+</file>
+
+<file path=ppt/slides/slide15.xml><?xml version="1.0" encoding="utf-8"?>
 <p:sld xmlns:a="http://schemas.openxmlformats.org/drawingml/2006/main" xmlns:r="http://schemas.openxmlformats.org/officeDocument/2006/relationships" xmlns:p="http://schemas.openxmlformats.org/presentationml/2006/main" show="0">
   <p:cSld>
     <p:spTree>
@@ -7759,7 +7931,7 @@
 </p:sld>
 </file>
 
-<file path=ppt/slides/slide15.xml><?xml version="1.0" encoding="utf-8"?>
+<file path=ppt/slides/slide16.xml><?xml version="1.0" encoding="utf-8"?>
 <p:sld xmlns:a="http://schemas.openxmlformats.org/drawingml/2006/main" xmlns:r="http://schemas.openxmlformats.org/officeDocument/2006/relationships" xmlns:p="http://schemas.openxmlformats.org/presentationml/2006/main">
   <p:cSld>
     <p:bg>
@@ -7809,7 +7981,7 @@
 </p:sld>
 </file>
 
-<file path=ppt/slides/slide16.xml><?xml version="1.0" encoding="utf-8"?>
+<file path=ppt/slides/slide17.xml><?xml version="1.0" encoding="utf-8"?>
 <p:sld xmlns:a="http://schemas.openxmlformats.org/drawingml/2006/main" xmlns:r="http://schemas.openxmlformats.org/officeDocument/2006/relationships" xmlns:p="http://schemas.openxmlformats.org/presentationml/2006/main">
   <p:cSld>
     <p:bg>
@@ -7943,7 +8115,7 @@
 </p:sld>
 </file>
 
-<file path=ppt/slides/slide17.xml><?xml version="1.0" encoding="utf-8"?>
+<file path=ppt/slides/slide18.xml><?xml version="1.0" encoding="utf-8"?>
 <p:sld xmlns:a="http://schemas.openxmlformats.org/drawingml/2006/main" xmlns:r="http://schemas.openxmlformats.org/officeDocument/2006/relationships" xmlns:p="http://schemas.openxmlformats.org/presentationml/2006/main">
   <p:cSld>
     <p:bg>
@@ -8132,7 +8304,7 @@
 </p:sld>
 </file>
 
-<file path=ppt/slides/slide18.xml><?xml version="1.0" encoding="utf-8"?>
+<file path=ppt/slides/slide19.xml><?xml version="1.0" encoding="utf-8"?>
 <p:sld xmlns:a="http://schemas.openxmlformats.org/drawingml/2006/main" xmlns:r="http://schemas.openxmlformats.org/officeDocument/2006/relationships" xmlns:p="http://schemas.openxmlformats.org/presentationml/2006/main">
   <p:cSld>
     <p:bg>
@@ -8344,184 +8516,6 @@
     <p:extLst>
       <p:ext uri="{BB962C8B-B14F-4D97-AF65-F5344CB8AC3E}">
         <p14:creationId xmlns:p14="http://schemas.microsoft.com/office/powerpoint/2010/main" val="3117039816"/>
-      </p:ext>
-    </p:extLst>
-  </p:cSld>
-  <p:clrMapOvr>
-    <a:masterClrMapping/>
-  </p:clrMapOvr>
-  <mc:AlternateContent xmlns:mc="http://schemas.openxmlformats.org/markup-compatibility/2006" xmlns:p159="http://schemas.microsoft.com/office/powerpoint/2015/09/main">
-    <mc:Choice Requires="p159">
-      <p:transition xmlns:p14="http://schemas.microsoft.com/office/powerpoint/2010/main" spd="slow" p14:dur="2000" advClick="0">
-        <p159:morph option="byObject"/>
-      </p:transition>
-    </mc:Choice>
-    <mc:Fallback xmlns="">
-      <p:transition spd="slow" advClick="0">
-        <p:fade/>
-      </p:transition>
-    </mc:Fallback>
-  </mc:AlternateContent>
-</p:sld>
-</file>
-
-<file path=ppt/slides/slide19.xml><?xml version="1.0" encoding="utf-8"?>
-<p:sld xmlns:a="http://schemas.openxmlformats.org/drawingml/2006/main" xmlns:r="http://schemas.openxmlformats.org/officeDocument/2006/relationships" xmlns:p="http://schemas.openxmlformats.org/presentationml/2006/main">
-  <p:cSld>
-    <p:bg>
-      <p:bgPr>
-        <a:solidFill>
-          <a:schemeClr val="tx1"/>
-        </a:solidFill>
-        <a:effectLst/>
-      </p:bgPr>
-    </p:bg>
-    <p:spTree>
-      <p:nvGrpSpPr>
-        <p:cNvPr id="1" name=""/>
-        <p:cNvGrpSpPr/>
-        <p:nvPr/>
-      </p:nvGrpSpPr>
-      <p:grpSpPr>
-        <a:xfrm>
-          <a:off x="0" y="0"/>
-          <a:ext cx="0" cy="0"/>
-          <a:chOff x="0" y="0"/>
-          <a:chExt cx="0" cy="0"/>
-        </a:xfrm>
-      </p:grpSpPr>
-      <p:sp>
-        <p:nvSpPr>
-          <p:cNvPr id="2" name="TextBox 1">
-            <a:extLst>
-              <a:ext uri="{FF2B5EF4-FFF2-40B4-BE49-F238E27FC236}">
-                <a16:creationId xmlns:a16="http://schemas.microsoft.com/office/drawing/2014/main" id="{26B0AA33-C97C-0EB5-E66D-2B1D2F2F6D7C}"/>
-              </a:ext>
-            </a:extLst>
-          </p:cNvPr>
-          <p:cNvSpPr txBox="1"/>
-          <p:nvPr/>
-        </p:nvSpPr>
-        <p:spPr>
-          <a:xfrm>
-            <a:off x="2188779" y="3136612"/>
-            <a:ext cx="7814442" cy="584775"/>
-          </a:xfrm>
-          <a:prstGeom prst="rect">
-            <a:avLst/>
-          </a:prstGeom>
-          <a:noFill/>
-        </p:spPr>
-        <p:txBody>
-          <a:bodyPr wrap="square" rtlCol="0">
-            <a:spAutoFit/>
-          </a:bodyPr>
-          <a:lstStyle/>
-          <a:p>
-            <a:pPr algn="ctr"/>
-            <a:r>
-              <a:rPr lang="en-US" sz="3200" dirty="0" err="1">
-                <a:solidFill>
-                  <a:schemeClr val="bg1"/>
-                </a:solidFill>
-                <a:effectLst/>
-                <a:latin typeface="Dubai Light" panose="020B0303030403030204" pitchFamily="34" charset="-78"/>
-                <a:cs typeface="Dubai Light" panose="020B0303030403030204" pitchFamily="34" charset="-78"/>
-              </a:rPr>
-              <a:t>Apakah</a:t>
-            </a:r>
-            <a:r>
-              <a:rPr lang="en-US" sz="3200" dirty="0">
-                <a:solidFill>
-                  <a:schemeClr val="bg1"/>
-                </a:solidFill>
-                <a:effectLst/>
-                <a:latin typeface="Dubai Light" panose="020B0303030403030204" pitchFamily="34" charset="-78"/>
-                <a:cs typeface="Dubai Light" panose="020B0303030403030204" pitchFamily="34" charset="-78"/>
-              </a:rPr>
-              <a:t> </a:t>
-            </a:r>
-            <a:r>
-              <a:rPr lang="en-US" sz="3200" dirty="0" err="1">
-                <a:solidFill>
-                  <a:schemeClr val="bg1"/>
-                </a:solidFill>
-                <a:effectLst/>
-                <a:latin typeface="Dubai Light" panose="020B0303030403030204" pitchFamily="34" charset="-78"/>
-                <a:cs typeface="Dubai Light" panose="020B0303030403030204" pitchFamily="34" charset="-78"/>
-              </a:rPr>
-              <a:t>mereka</a:t>
-            </a:r>
-            <a:r>
-              <a:rPr lang="en-US" sz="3200" dirty="0">
-                <a:solidFill>
-                  <a:schemeClr val="bg1"/>
-                </a:solidFill>
-                <a:effectLst/>
-                <a:latin typeface="Dubai Light" panose="020B0303030403030204" pitchFamily="34" charset="-78"/>
-                <a:cs typeface="Dubai Light" panose="020B0303030403030204" pitchFamily="34" charset="-78"/>
-              </a:rPr>
-              <a:t> </a:t>
-            </a:r>
-            <a:r>
-              <a:rPr lang="en-US" sz="3200" dirty="0" err="1">
-                <a:solidFill>
-                  <a:schemeClr val="bg1"/>
-                </a:solidFill>
-                <a:effectLst/>
-                <a:latin typeface="Dubai Light" panose="020B0303030403030204" pitchFamily="34" charset="-78"/>
-                <a:cs typeface="Dubai Light" panose="020B0303030403030204" pitchFamily="34" charset="-78"/>
-              </a:rPr>
-              <a:t>benar-benar</a:t>
-            </a:r>
-            <a:r>
-              <a:rPr lang="en-US" sz="3200" dirty="0">
-                <a:solidFill>
-                  <a:schemeClr val="bg1"/>
-                </a:solidFill>
-                <a:effectLst/>
-                <a:latin typeface="Dubai Light" panose="020B0303030403030204" pitchFamily="34" charset="-78"/>
-                <a:cs typeface="Dubai Light" panose="020B0303030403030204" pitchFamily="34" charset="-78"/>
-              </a:rPr>
-              <a:t> </a:t>
-            </a:r>
-            <a:r>
-              <a:rPr lang="en-US" sz="3200" dirty="0" err="1">
-                <a:solidFill>
-                  <a:schemeClr val="bg1"/>
-                </a:solidFill>
-                <a:effectLst/>
-                <a:latin typeface="Dubai Light" panose="020B0303030403030204" pitchFamily="34" charset="-78"/>
-                <a:cs typeface="Dubai Light" panose="020B0303030403030204" pitchFamily="34" charset="-78"/>
-              </a:rPr>
-              <a:t>nyata</a:t>
-            </a:r>
-            <a:r>
-              <a:rPr lang="en-US" sz="3200" dirty="0">
-                <a:solidFill>
-                  <a:schemeClr val="bg1"/>
-                </a:solidFill>
-                <a:effectLst/>
-                <a:latin typeface="Dubai Light" panose="020B0303030403030204" pitchFamily="34" charset="-78"/>
-                <a:cs typeface="Dubai Light" panose="020B0303030403030204" pitchFamily="34" charset="-78"/>
-              </a:rPr>
-              <a:t>?</a:t>
-            </a:r>
-            <a:endParaRPr lang="id-ID" sz="3200" dirty="0">
-              <a:solidFill>
-                <a:schemeClr val="bg1"/>
-              </a:solidFill>
-              <a:effectLst/>
-              <a:latin typeface="Dubai Light" panose="020B0303030403030204" pitchFamily="34" charset="-78"/>
-              <a:cs typeface="Dubai Light" panose="020B0303030403030204" pitchFamily="34" charset="-78"/>
-            </a:endParaRPr>
-          </a:p>
-        </p:txBody>
-      </p:sp>
-    </p:spTree>
-    <p:extLst>
-      <p:ext uri="{BB962C8B-B14F-4D97-AF65-F5344CB8AC3E}">
-        <p14:creationId xmlns:p14="http://schemas.microsoft.com/office/powerpoint/2010/main" val="1187846021"/>
       </p:ext>
     </p:extLst>
   </p:cSld>
@@ -10337,6 +10331,184 @@
                 <a:latin typeface="Dubai Light" panose="020B0303030403030204" pitchFamily="34" charset="-78"/>
                 <a:cs typeface="Dubai Light" panose="020B0303030403030204" pitchFamily="34" charset="-78"/>
               </a:rPr>
+              <a:t>Apakah</a:t>
+            </a:r>
+            <a:r>
+              <a:rPr lang="en-US" sz="3200" dirty="0">
+                <a:solidFill>
+                  <a:schemeClr val="bg1"/>
+                </a:solidFill>
+                <a:effectLst/>
+                <a:latin typeface="Dubai Light" panose="020B0303030403030204" pitchFamily="34" charset="-78"/>
+                <a:cs typeface="Dubai Light" panose="020B0303030403030204" pitchFamily="34" charset="-78"/>
+              </a:rPr>
+              <a:t> </a:t>
+            </a:r>
+            <a:r>
+              <a:rPr lang="en-US" sz="3200" dirty="0" err="1">
+                <a:solidFill>
+                  <a:schemeClr val="bg1"/>
+                </a:solidFill>
+                <a:effectLst/>
+                <a:latin typeface="Dubai Light" panose="020B0303030403030204" pitchFamily="34" charset="-78"/>
+                <a:cs typeface="Dubai Light" panose="020B0303030403030204" pitchFamily="34" charset="-78"/>
+              </a:rPr>
+              <a:t>mereka</a:t>
+            </a:r>
+            <a:r>
+              <a:rPr lang="en-US" sz="3200" dirty="0">
+                <a:solidFill>
+                  <a:schemeClr val="bg1"/>
+                </a:solidFill>
+                <a:effectLst/>
+                <a:latin typeface="Dubai Light" panose="020B0303030403030204" pitchFamily="34" charset="-78"/>
+                <a:cs typeface="Dubai Light" panose="020B0303030403030204" pitchFamily="34" charset="-78"/>
+              </a:rPr>
+              <a:t> </a:t>
+            </a:r>
+            <a:r>
+              <a:rPr lang="en-US" sz="3200" dirty="0" err="1">
+                <a:solidFill>
+                  <a:schemeClr val="bg1"/>
+                </a:solidFill>
+                <a:effectLst/>
+                <a:latin typeface="Dubai Light" panose="020B0303030403030204" pitchFamily="34" charset="-78"/>
+                <a:cs typeface="Dubai Light" panose="020B0303030403030204" pitchFamily="34" charset="-78"/>
+              </a:rPr>
+              <a:t>benar-benar</a:t>
+            </a:r>
+            <a:r>
+              <a:rPr lang="en-US" sz="3200" dirty="0">
+                <a:solidFill>
+                  <a:schemeClr val="bg1"/>
+                </a:solidFill>
+                <a:effectLst/>
+                <a:latin typeface="Dubai Light" panose="020B0303030403030204" pitchFamily="34" charset="-78"/>
+                <a:cs typeface="Dubai Light" panose="020B0303030403030204" pitchFamily="34" charset="-78"/>
+              </a:rPr>
+              <a:t> </a:t>
+            </a:r>
+            <a:r>
+              <a:rPr lang="en-US" sz="3200" dirty="0" err="1">
+                <a:solidFill>
+                  <a:schemeClr val="bg1"/>
+                </a:solidFill>
+                <a:effectLst/>
+                <a:latin typeface="Dubai Light" panose="020B0303030403030204" pitchFamily="34" charset="-78"/>
+                <a:cs typeface="Dubai Light" panose="020B0303030403030204" pitchFamily="34" charset="-78"/>
+              </a:rPr>
+              <a:t>nyata</a:t>
+            </a:r>
+            <a:r>
+              <a:rPr lang="en-US" sz="3200" dirty="0">
+                <a:solidFill>
+                  <a:schemeClr val="bg1"/>
+                </a:solidFill>
+                <a:effectLst/>
+                <a:latin typeface="Dubai Light" panose="020B0303030403030204" pitchFamily="34" charset="-78"/>
+                <a:cs typeface="Dubai Light" panose="020B0303030403030204" pitchFamily="34" charset="-78"/>
+              </a:rPr>
+              <a:t>?</a:t>
+            </a:r>
+            <a:endParaRPr lang="id-ID" sz="3200" dirty="0">
+              <a:solidFill>
+                <a:schemeClr val="bg1"/>
+              </a:solidFill>
+              <a:effectLst/>
+              <a:latin typeface="Dubai Light" panose="020B0303030403030204" pitchFamily="34" charset="-78"/>
+              <a:cs typeface="Dubai Light" panose="020B0303030403030204" pitchFamily="34" charset="-78"/>
+            </a:endParaRPr>
+          </a:p>
+        </p:txBody>
+      </p:sp>
+    </p:spTree>
+    <p:extLst>
+      <p:ext uri="{BB962C8B-B14F-4D97-AF65-F5344CB8AC3E}">
+        <p14:creationId xmlns:p14="http://schemas.microsoft.com/office/powerpoint/2010/main" val="1187846021"/>
+      </p:ext>
+    </p:extLst>
+  </p:cSld>
+  <p:clrMapOvr>
+    <a:masterClrMapping/>
+  </p:clrMapOvr>
+  <mc:AlternateContent xmlns:mc="http://schemas.openxmlformats.org/markup-compatibility/2006" xmlns:p159="http://schemas.microsoft.com/office/powerpoint/2015/09/main">
+    <mc:Choice Requires="p159">
+      <p:transition xmlns:p14="http://schemas.microsoft.com/office/powerpoint/2010/main" spd="slow" p14:dur="2000" advClick="0">
+        <p159:morph option="byObject"/>
+      </p:transition>
+    </mc:Choice>
+    <mc:Fallback xmlns="">
+      <p:transition spd="slow" advClick="0">
+        <p:fade/>
+      </p:transition>
+    </mc:Fallback>
+  </mc:AlternateContent>
+</p:sld>
+</file>
+
+<file path=ppt/slides/slide21.xml><?xml version="1.0" encoding="utf-8"?>
+<p:sld xmlns:a="http://schemas.openxmlformats.org/drawingml/2006/main" xmlns:r="http://schemas.openxmlformats.org/officeDocument/2006/relationships" xmlns:p="http://schemas.openxmlformats.org/presentationml/2006/main">
+  <p:cSld>
+    <p:bg>
+      <p:bgPr>
+        <a:solidFill>
+          <a:schemeClr val="tx1"/>
+        </a:solidFill>
+        <a:effectLst/>
+      </p:bgPr>
+    </p:bg>
+    <p:spTree>
+      <p:nvGrpSpPr>
+        <p:cNvPr id="1" name=""/>
+        <p:cNvGrpSpPr/>
+        <p:nvPr/>
+      </p:nvGrpSpPr>
+      <p:grpSpPr>
+        <a:xfrm>
+          <a:off x="0" y="0"/>
+          <a:ext cx="0" cy="0"/>
+          <a:chOff x="0" y="0"/>
+          <a:chExt cx="0" cy="0"/>
+        </a:xfrm>
+      </p:grpSpPr>
+      <p:sp>
+        <p:nvSpPr>
+          <p:cNvPr id="2" name="TextBox 1">
+            <a:extLst>
+              <a:ext uri="{FF2B5EF4-FFF2-40B4-BE49-F238E27FC236}">
+                <a16:creationId xmlns:a16="http://schemas.microsoft.com/office/drawing/2014/main" id="{26B0AA33-C97C-0EB5-E66D-2B1D2F2F6D7C}"/>
+              </a:ext>
+            </a:extLst>
+          </p:cNvPr>
+          <p:cNvSpPr txBox="1"/>
+          <p:nvPr/>
+        </p:nvSpPr>
+        <p:spPr>
+          <a:xfrm>
+            <a:off x="2188779" y="3136612"/>
+            <a:ext cx="7814442" cy="584775"/>
+          </a:xfrm>
+          <a:prstGeom prst="rect">
+            <a:avLst/>
+          </a:prstGeom>
+          <a:noFill/>
+        </p:spPr>
+        <p:txBody>
+          <a:bodyPr wrap="square" rtlCol="0">
+            <a:spAutoFit/>
+          </a:bodyPr>
+          <a:lstStyle/>
+          <a:p>
+            <a:pPr algn="ctr"/>
+            <a:r>
+              <a:rPr lang="en-US" sz="3200" dirty="0" err="1">
+                <a:solidFill>
+                  <a:schemeClr val="bg1"/>
+                </a:solidFill>
+                <a:effectLst/>
+                <a:latin typeface="Dubai Light" panose="020B0303030403030204" pitchFamily="34" charset="-78"/>
+                <a:cs typeface="Dubai Light" panose="020B0303030403030204" pitchFamily="34" charset="-78"/>
+              </a:rPr>
               <a:t>Namun</a:t>
             </a:r>
             <a:r>
@@ -10441,7 +10613,7 @@
 </p:sld>
 </file>
 
-<file path=ppt/slides/slide21.xml><?xml version="1.0" encoding="utf-8"?>
+<file path=ppt/slides/slide22.xml><?xml version="1.0" encoding="utf-8"?>
 <p:sld xmlns:a="http://schemas.openxmlformats.org/drawingml/2006/main" xmlns:r="http://schemas.openxmlformats.org/officeDocument/2006/relationships" xmlns:p="http://schemas.openxmlformats.org/presentationml/2006/main">
   <p:cSld>
     <p:bg>
@@ -10542,7 +10714,7 @@
 </p:sld>
 </file>
 
-<file path=ppt/slides/slide22.xml><?xml version="1.0" encoding="utf-8"?>
+<file path=ppt/slides/slide23.xml><?xml version="1.0" encoding="utf-8"?>
 <p:sld xmlns:a="http://schemas.openxmlformats.org/drawingml/2006/main" xmlns:r="http://schemas.openxmlformats.org/officeDocument/2006/relationships" xmlns:p="http://schemas.openxmlformats.org/presentationml/2006/main">
   <p:cSld>
     <p:bg>
@@ -10729,7 +10901,7 @@
 </p:sld>
 </file>
 
-<file path=ppt/slides/slide23.xml><?xml version="1.0" encoding="utf-8"?>
+<file path=ppt/slides/slide24.xml><?xml version="1.0" encoding="utf-8"?>
 <p:sld xmlns:a="http://schemas.openxmlformats.org/drawingml/2006/main" xmlns:r="http://schemas.openxmlformats.org/officeDocument/2006/relationships" xmlns:p="http://schemas.openxmlformats.org/presentationml/2006/main">
   <p:cSld>
     <p:bg>
@@ -10879,7 +11051,7 @@
 </p:sld>
 </file>
 
-<file path=ppt/slides/slide24.xml><?xml version="1.0" encoding="utf-8"?>
+<file path=ppt/slides/slide25.xml><?xml version="1.0" encoding="utf-8"?>
 <p:sld xmlns:a="http://schemas.openxmlformats.org/drawingml/2006/main" xmlns:r="http://schemas.openxmlformats.org/officeDocument/2006/relationships" xmlns:p="http://schemas.openxmlformats.org/presentationml/2006/main">
   <p:cSld>
     <p:bg>
@@ -10999,7 +11171,7 @@
 </p:sld>
 </file>
 
-<file path=ppt/slides/slide25.xml><?xml version="1.0" encoding="utf-8"?>
+<file path=ppt/slides/slide26.xml><?xml version="1.0" encoding="utf-8"?>
 <p:sld xmlns:a="http://schemas.openxmlformats.org/drawingml/2006/main" xmlns:r="http://schemas.openxmlformats.org/officeDocument/2006/relationships" xmlns:p="http://schemas.openxmlformats.org/presentationml/2006/main">
   <p:cSld>
     <p:bg>

</xml_diff>